<commit_message>
add if statements and while loops
</commit_message>
<xml_diff>
--- a/Python.pptx
+++ b/Python.pptx
@@ -5,10 +5,10 @@
     <p:sldMasterId id="2147483658" r:id="rId1"/>
   </p:sldMasterIdLst>
   <p:notesMasterIdLst>
-    <p:notesMasterId r:id="rId26"/>
+    <p:notesMasterId r:id="rId31"/>
   </p:notesMasterIdLst>
   <p:handoutMasterIdLst>
-    <p:handoutMasterId r:id="rId27"/>
+    <p:handoutMasterId r:id="rId32"/>
   </p:handoutMasterIdLst>
   <p:sldIdLst>
     <p:sldId id="256" r:id="rId2"/>
@@ -27,43 +27,48 @@
     <p:sldId id="299" r:id="rId15"/>
     <p:sldId id="300" r:id="rId16"/>
     <p:sldId id="301" r:id="rId17"/>
-    <p:sldId id="281" r:id="rId18"/>
-    <p:sldId id="289" r:id="rId19"/>
-    <p:sldId id="282" r:id="rId20"/>
-    <p:sldId id="283" r:id="rId21"/>
-    <p:sldId id="286" r:id="rId22"/>
-    <p:sldId id="287" r:id="rId23"/>
-    <p:sldId id="280" r:id="rId24"/>
-    <p:sldId id="271" r:id="rId25"/>
+    <p:sldId id="302" r:id="rId18"/>
+    <p:sldId id="303" r:id="rId19"/>
+    <p:sldId id="304" r:id="rId20"/>
+    <p:sldId id="305" r:id="rId21"/>
+    <p:sldId id="306" r:id="rId22"/>
+    <p:sldId id="281" r:id="rId23"/>
+    <p:sldId id="289" r:id="rId24"/>
+    <p:sldId id="282" r:id="rId25"/>
+    <p:sldId id="283" r:id="rId26"/>
+    <p:sldId id="286" r:id="rId27"/>
+    <p:sldId id="287" r:id="rId28"/>
+    <p:sldId id="280" r:id="rId29"/>
+    <p:sldId id="271" r:id="rId30"/>
   </p:sldIdLst>
   <p:sldSz cx="9144000" cy="5143500" type="screen16x9"/>
   <p:notesSz cx="6858000" cy="9144000"/>
   <p:embeddedFontLst>
     <p:embeddedFont>
       <p:font typeface="Consolas" panose="020B0609020204030204" pitchFamily="49" charset="0"/>
-      <p:regular r:id="rId28"/>
-      <p:bold r:id="rId29"/>
-      <p:italic r:id="rId30"/>
-      <p:boldItalic r:id="rId31"/>
+      <p:regular r:id="rId33"/>
+      <p:bold r:id="rId34"/>
+      <p:italic r:id="rId35"/>
+      <p:boldItalic r:id="rId36"/>
     </p:embeddedFont>
     <p:embeddedFont>
       <p:font typeface="Roboto Slab" panose="020B0604020202020204" charset="0"/>
-      <p:regular r:id="rId32"/>
-      <p:bold r:id="rId33"/>
+      <p:regular r:id="rId37"/>
+      <p:bold r:id="rId38"/>
     </p:embeddedFont>
     <p:embeddedFont>
       <p:font typeface="Source Sans Pro" panose="020B0503030403020204" pitchFamily="34" charset="0"/>
-      <p:regular r:id="rId34"/>
-      <p:bold r:id="rId35"/>
-      <p:italic r:id="rId36"/>
-      <p:boldItalic r:id="rId37"/>
+      <p:regular r:id="rId39"/>
+      <p:bold r:id="rId40"/>
+      <p:italic r:id="rId41"/>
+      <p:boldItalic r:id="rId42"/>
     </p:embeddedFont>
     <p:embeddedFont>
       <p:font typeface="Trebuchet MS" panose="020B0603020202020204" pitchFamily="34" charset="0"/>
-      <p:regular r:id="rId38"/>
-      <p:bold r:id="rId39"/>
-      <p:italic r:id="rId40"/>
-      <p:boldItalic r:id="rId41"/>
+      <p:regular r:id="rId43"/>
+      <p:bold r:id="rId44"/>
+      <p:italic r:id="rId45"/>
+      <p:boldItalic r:id="rId46"/>
     </p:embeddedFont>
   </p:embeddedFontLst>
   <p:defaultTextStyle>
@@ -5746,12 +5751,17 @@
               </a:rPr>
               <a:t>True</a:t>
             </a:r>
-            <a:r>
-              <a:rPr lang="en-US" sz="1200">
-                <a:latin typeface="Consolas" panose="020B0609020204030204" pitchFamily="49" charset="0"/>
-                <a:cs typeface="Courier New" panose="02070309020205020404" pitchFamily="49" charset="0"/>
-              </a:rPr>
-              <a:t>, </a:t>
+          </a:p>
+          <a:p>
+            <a:pPr marL="76200" indent="0">
+              <a:buNone/>
+            </a:pPr>
+            <a:r>
+              <a:rPr lang="en-US" sz="1200">
+                <a:latin typeface="Consolas" panose="020B0609020204030204" pitchFamily="49" charset="0"/>
+                <a:cs typeface="Courier New" panose="02070309020205020404" pitchFamily="49" charset="0"/>
+              </a:rPr>
+              <a:t>b = </a:t>
             </a:r>
             <a:r>
               <a:rPr lang="en-US" sz="1200">
@@ -6360,7 +6370,7 @@
                 <a:latin typeface="Consolas" panose="020B0609020204030204" pitchFamily="49" charset="0"/>
                 <a:cs typeface="Courier New" panose="02070309020205020404" pitchFamily="49" charset="0"/>
               </a:rPr>
-              <a:t> green'</a:t>
+              <a:t> 'green'</a:t>
             </a:r>
             <a:r>
               <a:rPr lang="en-US" sz="1200">
@@ -7588,8 +7598,40 @@
               <a:buNone/>
             </a:pPr>
             <a:r>
+              <a:rPr lang="en-US" sz="1400">
+                <a:solidFill>
+                  <a:schemeClr val="accent1"/>
+                </a:solidFill>
+              </a:rPr>
+              <a:t>Un</a:t>
+            </a:r>
+            <a:r>
               <a:rPr lang="en-US" sz="1400"/>
-              <a:t>Unordered, unchangeable, and no duplicate values</a:t>
+              <a:t>ordered, </a:t>
+            </a:r>
+            <a:r>
+              <a:rPr lang="en-US" sz="1400">
+                <a:solidFill>
+                  <a:schemeClr val="accent1"/>
+                </a:solidFill>
+              </a:rPr>
+              <a:t>un</a:t>
+            </a:r>
+            <a:r>
+              <a:rPr lang="en-US" sz="1400"/>
+              <a:t>changeable, and </a:t>
+            </a:r>
+            <a:r>
+              <a:rPr lang="en-US" sz="1400">
+                <a:solidFill>
+                  <a:schemeClr val="accent1"/>
+                </a:solidFill>
+              </a:rPr>
+              <a:t>no</a:t>
+            </a:r>
+            <a:r>
+              <a:rPr lang="en-US" sz="1400"/>
+              <a:t> duplicate values</a:t>
             </a:r>
           </a:p>
           <a:p>
@@ -8069,7 +8111,7 @@
   <p:cSld>
     <p:spTree>
       <p:nvGrpSpPr>
-        <p:cNvPr id="1" name="Shape 96"/>
+        <p:cNvPr id="1" name=""/>
         <p:cNvGrpSpPr/>
         <p:nvPr/>
       </p:nvGrpSpPr>
@@ -8083,93 +8125,264 @@
       </p:grpSpPr>
       <p:sp>
         <p:nvSpPr>
-          <p:cNvPr id="97" name="Google Shape;97;p15"/>
-          <p:cNvSpPr txBox="1">
+          <p:cNvPr id="2" name="Title 1">
+            <a:extLst>
+              <a:ext uri="{FF2B5EF4-FFF2-40B4-BE49-F238E27FC236}">
+                <a16:creationId xmlns:a16="http://schemas.microsoft.com/office/drawing/2014/main" id="{024AD384-5AD1-4435-A943-1241B2FACD62}"/>
+              </a:ext>
+            </a:extLst>
+          </p:cNvPr>
+          <p:cNvSpPr>
             <a:spLocks noGrp="1"/>
           </p:cNvSpPr>
           <p:nvPr>
-            <p:ph type="ctrTitle"/>
+            <p:ph type="title"/>
+          </p:nvPr>
+        </p:nvSpPr>
+        <p:spPr/>
+        <p:txBody>
+          <a:bodyPr/>
+          <a:lstStyle/>
+          <a:p>
+            <a:r>
+              <a:rPr lang="en-US"/>
+              <a:t>Python </a:t>
+            </a:r>
+            <a:r>
+              <a:rPr lang="en-US" sz="2400"/>
+              <a:t>Dictionaries</a:t>
+            </a:r>
+            <a:endParaRPr lang="fa-IR"/>
+          </a:p>
+        </p:txBody>
+      </p:sp>
+      <p:sp>
+        <p:nvSpPr>
+          <p:cNvPr id="3" name="Text Placeholder 2">
+            <a:extLst>
+              <a:ext uri="{FF2B5EF4-FFF2-40B4-BE49-F238E27FC236}">
+                <a16:creationId xmlns:a16="http://schemas.microsoft.com/office/drawing/2014/main" id="{58BE3078-8B89-4550-B497-93E4DADBD57E}"/>
+              </a:ext>
+            </a:extLst>
+          </p:cNvPr>
+          <p:cNvSpPr>
+            <a:spLocks noGrp="1"/>
+          </p:cNvSpPr>
+          <p:nvPr>
+            <p:ph type="body" idx="1"/>
           </p:nvPr>
         </p:nvSpPr>
         <p:spPr>
           <a:xfrm>
-            <a:off x="1655700" y="1991850"/>
-            <a:ext cx="5832600" cy="1159800"/>
+            <a:off x="786150" y="1142608"/>
+            <a:ext cx="7571700" cy="3626431"/>
           </a:xfrm>
-          <a:prstGeom prst="rect">
-            <a:avLst/>
-          </a:prstGeom>
         </p:spPr>
         <p:txBody>
-          <a:bodyPr spcFirstLastPara="1" wrap="square" lIns="91425" tIns="91425" rIns="91425" bIns="91425" anchor="ctr" anchorCtr="0">
-            <a:noAutofit/>
-          </a:bodyPr>
+          <a:bodyPr/>
           <a:lstStyle/>
           <a:p>
-            <a:pPr marL="0" lvl="0" indent="0" algn="ctr" rtl="0">
-              <a:spcBef>
-                <a:spcPts val="0"/>
-              </a:spcBef>
-              <a:spcAft>
-                <a:spcPts val="0"/>
-              </a:spcAft>
-              <a:buNone/>
-            </a:pPr>
-            <a:r>
-              <a:rPr lang="en-US" sz="6000">
-                <a:solidFill>
-                  <a:srgbClr val="E6E6E6"/>
-                </a:solidFill>
-              </a:rPr>
-              <a:t>2</a:t>
-            </a:r>
-            <a:endParaRPr sz="6000">
-              <a:solidFill>
-                <a:srgbClr val="E6E6E6"/>
-              </a:solidFill>
+            <a:pPr marL="76200" indent="0">
+              <a:buNone/>
+            </a:pPr>
+            <a:r>
+              <a:rPr lang="en-US" sz="1400"/>
+              <a:t>Ordered, changeable, and </a:t>
+            </a:r>
+            <a:r>
+              <a:rPr lang="en-US" sz="1400">
+                <a:solidFill>
+                  <a:schemeClr val="accent1"/>
+                </a:solidFill>
+              </a:rPr>
+              <a:t>no</a:t>
+            </a:r>
+            <a:r>
+              <a:rPr lang="en-US" sz="1400"/>
+              <a:t> duplicate values</a:t>
+            </a:r>
+          </a:p>
+          <a:p>
+            <a:pPr marL="76200" indent="0">
+              <a:buNone/>
+            </a:pPr>
+            <a:r>
+              <a:rPr lang="en-US" sz="1200">
+                <a:latin typeface="Consolas" panose="020B0609020204030204" pitchFamily="49" charset="0"/>
+                <a:cs typeface="Courier New" panose="02070309020205020404" pitchFamily="49" charset="0"/>
+              </a:rPr>
+              <a:t>fruits = {'apple': 'green', 'banana': 'yellow', 'cherry': 'red'}</a:t>
+            </a:r>
+          </a:p>
+          <a:p>
+            <a:pPr marL="76200" indent="0">
+              <a:buNone/>
+            </a:pPr>
+            <a:r>
+              <a:rPr lang="en-US" sz="1200">
+                <a:latin typeface="Consolas" panose="020B0609020204030204" pitchFamily="49" charset="0"/>
+                <a:cs typeface="Courier New" panose="02070309020205020404" pitchFamily="49" charset="0"/>
+              </a:rPr>
+              <a:t>print(fruits['apple'])</a:t>
+            </a:r>
+          </a:p>
+          <a:p>
+            <a:pPr marL="76200" indent="0">
+              <a:buNone/>
+            </a:pPr>
+            <a:r>
+              <a:rPr lang="en-US" sz="1200">
+                <a:latin typeface="Consolas" panose="020B0609020204030204" pitchFamily="49" charset="0"/>
+                <a:cs typeface="Courier New" panose="02070309020205020404" pitchFamily="49" charset="0"/>
+              </a:rPr>
+              <a:t>print('orange' in fruits)</a:t>
+            </a:r>
+          </a:p>
+          <a:p>
+            <a:pPr marL="76200" indent="0">
+              <a:buNone/>
+            </a:pPr>
+            <a:r>
+              <a:rPr lang="en-US" sz="1200">
+                <a:latin typeface="Consolas" panose="020B0609020204030204" pitchFamily="49" charset="0"/>
+                <a:cs typeface="Courier New" panose="02070309020205020404" pitchFamily="49" charset="0"/>
+              </a:rPr>
+              <a:t>print(len(fruits))</a:t>
+            </a:r>
+          </a:p>
+          <a:p>
+            <a:pPr marL="76200" indent="0">
+              <a:buNone/>
+            </a:pPr>
+            <a:r>
+              <a:rPr lang="en-US" sz="1200">
+                <a:latin typeface="Consolas" panose="020B0609020204030204" pitchFamily="49" charset="0"/>
+                <a:cs typeface="Courier New" panose="02070309020205020404" pitchFamily="49" charset="0"/>
+              </a:rPr>
+              <a:t>print(fruits</a:t>
+            </a:r>
+            <a:r>
+              <a:rPr lang="en-US" sz="1200">
+                <a:solidFill>
+                  <a:schemeClr val="accent1"/>
+                </a:solidFill>
+                <a:latin typeface="Consolas" panose="020B0609020204030204" pitchFamily="49" charset="0"/>
+                <a:cs typeface="Courier New" panose="02070309020205020404" pitchFamily="49" charset="0"/>
+              </a:rPr>
+              <a:t>.keys()</a:t>
+            </a:r>
+            <a:r>
+              <a:rPr lang="en-US" sz="1200">
+                <a:latin typeface="Consolas" panose="020B0609020204030204" pitchFamily="49" charset="0"/>
+                <a:cs typeface="Courier New" panose="02070309020205020404" pitchFamily="49" charset="0"/>
+              </a:rPr>
+              <a:t>)</a:t>
+            </a:r>
+          </a:p>
+          <a:p>
+            <a:pPr marL="76200" indent="0">
+              <a:buNone/>
+            </a:pPr>
+            <a:r>
+              <a:rPr lang="en-US" sz="1200">
+                <a:latin typeface="Consolas" panose="020B0609020204030204" pitchFamily="49" charset="0"/>
+                <a:cs typeface="Courier New" panose="02070309020205020404" pitchFamily="49" charset="0"/>
+              </a:rPr>
+              <a:t>print(fruits</a:t>
+            </a:r>
+            <a:r>
+              <a:rPr lang="en-US" sz="1200">
+                <a:solidFill>
+                  <a:schemeClr val="accent1"/>
+                </a:solidFill>
+                <a:latin typeface="Consolas" panose="020B0609020204030204" pitchFamily="49" charset="0"/>
+                <a:cs typeface="Courier New" panose="02070309020205020404" pitchFamily="49" charset="0"/>
+              </a:rPr>
+              <a:t>.values()</a:t>
+            </a:r>
+            <a:r>
+              <a:rPr lang="en-US" sz="1200">
+                <a:latin typeface="Consolas" panose="020B0609020204030204" pitchFamily="49" charset="0"/>
+                <a:cs typeface="Courier New" panose="02070309020205020404" pitchFamily="49" charset="0"/>
+              </a:rPr>
+              <a:t>)</a:t>
+            </a:r>
+          </a:p>
+          <a:p>
+            <a:pPr marL="76200" indent="0">
+              <a:buNone/>
+            </a:pPr>
+            <a:endParaRPr lang="en-US" sz="1200">
+              <a:latin typeface="Consolas" panose="020B0609020204030204" pitchFamily="49" charset="0"/>
+              <a:cs typeface="Courier New" panose="02070309020205020404" pitchFamily="49" charset="0"/>
             </a:endParaRPr>
           </a:p>
           <a:p>
-            <a:pPr marL="0" lvl="0" indent="0" algn="ctr" rtl="0">
-              <a:spcBef>
-                <a:spcPts val="0"/>
-              </a:spcBef>
-              <a:spcAft>
-                <a:spcPts val="0"/>
-              </a:spcAft>
-              <a:buNone/>
-            </a:pPr>
-            <a:r>
-              <a:rPr lang="en"/>
-              <a:t>NumPy</a:t>
-            </a:r>
-            <a:endParaRPr/>
+            <a:pPr marL="76200" indent="0">
+              <a:buNone/>
+            </a:pPr>
+            <a:r>
+              <a:rPr lang="en-US" sz="1400"/>
+              <a:t>Update sets</a:t>
+            </a:r>
+          </a:p>
+          <a:p>
+            <a:pPr marL="76200" indent="0">
+              <a:buNone/>
+            </a:pPr>
+            <a:r>
+              <a:rPr lang="en-US" sz="1200">
+                <a:latin typeface="Consolas" panose="020B0609020204030204" pitchFamily="49" charset="0"/>
+                <a:cs typeface="Courier New" panose="02070309020205020404" pitchFamily="49" charset="0"/>
+              </a:rPr>
+              <a:t>fruits['apple'] = 'red'</a:t>
+            </a:r>
+          </a:p>
+          <a:p>
+            <a:pPr marL="76200" indent="0">
+              <a:buNone/>
+            </a:pPr>
+            <a:r>
+              <a:rPr lang="en-US" sz="1200">
+                <a:latin typeface="Consolas" panose="020B0609020204030204" pitchFamily="49" charset="0"/>
+                <a:cs typeface="Courier New" panose="02070309020205020404" pitchFamily="49" charset="0"/>
+              </a:rPr>
+              <a:t>fruits['kiwi'] = 'green'</a:t>
+            </a:r>
+          </a:p>
+          <a:p>
+            <a:pPr marL="76200" indent="0">
+              <a:buNone/>
+            </a:pPr>
+            <a:r>
+              <a:rPr lang="en-US" sz="1200">
+                <a:latin typeface="Consolas" panose="020B0609020204030204" pitchFamily="49" charset="0"/>
+                <a:cs typeface="Courier New" panose="02070309020205020404" pitchFamily="49" charset="0"/>
+              </a:rPr>
+              <a:t>fruits.pop('banana')</a:t>
+            </a:r>
           </a:p>
         </p:txBody>
       </p:sp>
       <p:sp>
         <p:nvSpPr>
-          <p:cNvPr id="99" name="Google Shape;99;p15"/>
-          <p:cNvSpPr txBox="1">
+          <p:cNvPr id="4" name="Slide Number Placeholder 3">
+            <a:extLst>
+              <a:ext uri="{FF2B5EF4-FFF2-40B4-BE49-F238E27FC236}">
+                <a16:creationId xmlns:a16="http://schemas.microsoft.com/office/drawing/2014/main" id="{64987AE6-EC0E-43DD-9376-95A5602EE5E1}"/>
+              </a:ext>
+            </a:extLst>
+          </p:cNvPr>
+          <p:cNvSpPr>
             <a:spLocks noGrp="1"/>
           </p:cNvSpPr>
           <p:nvPr>
-            <p:ph type="sldNum" idx="4294967295"/>
+            <p:ph type="sldNum" idx="12"/>
           </p:nvPr>
         </p:nvSpPr>
-        <p:spPr>
-          <a:xfrm>
-            <a:off x="8404384" y="4749851"/>
-            <a:ext cx="548700" cy="393600"/>
-          </a:xfrm>
-          <a:prstGeom prst="rect">
-            <a:avLst/>
-          </a:prstGeom>
-        </p:spPr>
+        <p:spPr/>
         <p:txBody>
-          <a:bodyPr spcFirstLastPara="1" wrap="square" lIns="91425" tIns="91425" rIns="91425" bIns="91425" anchor="t" anchorCtr="0">
-            <a:noAutofit/>
-          </a:bodyPr>
+          <a:bodyPr/>
           <a:lstStyle/>
           <a:p>
             <a:pPr marL="0" lvl="0" indent="0" algn="r" rtl="0">
@@ -8182,17 +8395,17 @@
               <a:buNone/>
             </a:pPr>
             <a:fld id="{00000000-1234-1234-1234-123412341234}" type="slidenum">
-              <a:rPr lang="en"/>
+              <a:rPr lang="en" smtClean="0"/>
               <a:t>17</a:t>
             </a:fld>
-            <a:endParaRPr/>
+            <a:endParaRPr lang="en"/>
           </a:p>
         </p:txBody>
       </p:sp>
     </p:spTree>
     <p:extLst>
       <p:ext uri="{BB962C8B-B14F-4D97-AF65-F5344CB8AC3E}">
-        <p14:creationId xmlns:p14="http://schemas.microsoft.com/office/powerpoint/2010/main" val="1620004517"/>
+        <p14:creationId xmlns:p14="http://schemas.microsoft.com/office/powerpoint/2010/main" val="1072694343"/>
       </p:ext>
     </p:extLst>
   </p:cSld>
@@ -8241,12 +8454,8 @@
           <a:lstStyle/>
           <a:p>
             <a:r>
-              <a:rPr lang="en-US" err="1"/>
-              <a:t>Numpy</a:t>
-            </a:r>
-            <a:r>
               <a:rPr lang="en-US"/>
-              <a:t> Introduction</a:t>
+              <a:t>Python If Statements</a:t>
             </a:r>
             <a:endParaRPr lang="fa-IR"/>
           </a:p>
@@ -8278,15 +8487,108 @@
           <a:bodyPr/>
           <a:lstStyle/>
           <a:p>
-            <a:r>
-              <a:rPr lang="en-US" sz="1800"/>
-              <a:t>NumPy is a Python library used for working with arrays.</a:t>
-            </a:r>
-          </a:p>
-          <a:p>
-            <a:r>
-              <a:rPr lang="en-US" sz="1800"/>
-              <a:t>NumPy is short for "Numerical Python".</a:t>
+            <a:pPr marL="76200" indent="0">
+              <a:buNone/>
+            </a:pPr>
+            <a:r>
+              <a:rPr lang="en-US" sz="1400"/>
+              <a:t>If, elif, and else</a:t>
+            </a:r>
+          </a:p>
+          <a:p>
+            <a:pPr marL="76200" indent="0">
+              <a:buNone/>
+            </a:pPr>
+            <a:r>
+              <a:rPr lang="en-US" sz="1200">
+                <a:latin typeface="Consolas" panose="020B0609020204030204" pitchFamily="49" charset="0"/>
+                <a:cs typeface="Courier New" panose="02070309020205020404" pitchFamily="49" charset="0"/>
+              </a:rPr>
+              <a:t>a = 200</a:t>
+            </a:r>
+          </a:p>
+          <a:p>
+            <a:pPr marL="76200" indent="0">
+              <a:buNone/>
+            </a:pPr>
+            <a:r>
+              <a:rPr lang="en-US" sz="1200">
+                <a:latin typeface="Consolas" panose="020B0609020204030204" pitchFamily="49" charset="0"/>
+                <a:cs typeface="Courier New" panose="02070309020205020404" pitchFamily="49" charset="0"/>
+              </a:rPr>
+              <a:t>b = 33</a:t>
+            </a:r>
+          </a:p>
+          <a:p>
+            <a:pPr marL="76200" indent="0">
+              <a:buNone/>
+            </a:pPr>
+            <a:r>
+              <a:rPr lang="en-US" sz="1200">
+                <a:latin typeface="Consolas" panose="020B0609020204030204" pitchFamily="49" charset="0"/>
+                <a:cs typeface="Courier New" panose="02070309020205020404" pitchFamily="49" charset="0"/>
+              </a:rPr>
+              <a:t>if a &gt; b:</a:t>
+            </a:r>
+          </a:p>
+          <a:p>
+            <a:pPr marL="76200" indent="0">
+              <a:buNone/>
+            </a:pPr>
+            <a:r>
+              <a:rPr lang="en-US" sz="1200">
+                <a:latin typeface="Consolas" panose="020B0609020204030204" pitchFamily="49" charset="0"/>
+                <a:cs typeface="Courier New" panose="02070309020205020404" pitchFamily="49" charset="0"/>
+              </a:rPr>
+              <a:t>    print('a') </a:t>
+            </a:r>
+          </a:p>
+          <a:p>
+            <a:pPr marL="76200" indent="0">
+              <a:buNone/>
+            </a:pPr>
+            <a:r>
+              <a:rPr lang="en-US" sz="1200">
+                <a:latin typeface="Consolas" panose="020B0609020204030204" pitchFamily="49" charset="0"/>
+                <a:cs typeface="Courier New" panose="02070309020205020404" pitchFamily="49" charset="0"/>
+              </a:rPr>
+              <a:t>elif a &lt; b:</a:t>
+            </a:r>
+          </a:p>
+          <a:p>
+            <a:pPr marL="76200" indent="0">
+              <a:buNone/>
+            </a:pPr>
+            <a:r>
+              <a:rPr lang="en-US" sz="1200">
+                <a:latin typeface="Consolas" panose="020B0609020204030204" pitchFamily="49" charset="0"/>
+                <a:cs typeface="Courier New" panose="02070309020205020404" pitchFamily="49" charset="0"/>
+              </a:rPr>
+              <a:t>    print('b')</a:t>
+            </a:r>
+          </a:p>
+          <a:p>
+            <a:pPr marL="76200" indent="0">
+              <a:buNone/>
+            </a:pPr>
+            <a:r>
+              <a:rPr lang="en-US" sz="1200">
+                <a:latin typeface="Consolas" panose="020B0609020204030204" pitchFamily="49" charset="0"/>
+                <a:cs typeface="Courier New" panose="02070309020205020404" pitchFamily="49" charset="0"/>
+              </a:rPr>
+              <a:t>else:</a:t>
+            </a:r>
+          </a:p>
+          <a:p>
+            <a:pPr marL="76200" indent="0">
+              <a:buNone/>
+            </a:pPr>
+            <a:r>
+              <a:rPr lang="en-US" sz="1200">
+                <a:latin typeface="Consolas" panose="020B0609020204030204" pitchFamily="49" charset="0"/>
+                <a:cs typeface="Courier New" panose="02070309020205020404" pitchFamily="49" charset="0"/>
+              </a:rPr>
+              <a:t>    print('=')</a:t>
             </a:r>
           </a:p>
         </p:txBody>
@@ -8332,7 +8634,7 @@
     </p:spTree>
     <p:extLst>
       <p:ext uri="{BB962C8B-B14F-4D97-AF65-F5344CB8AC3E}">
-        <p14:creationId xmlns:p14="http://schemas.microsoft.com/office/powerpoint/2010/main" val="4156460407"/>
+        <p14:creationId xmlns:p14="http://schemas.microsoft.com/office/powerpoint/2010/main" val="710221511"/>
       </p:ext>
     </p:extLst>
   </p:cSld>
@@ -8347,7 +8649,7 @@
   <p:cSld>
     <p:spTree>
       <p:nvGrpSpPr>
-        <p:cNvPr id="1" name="Shape 96"/>
+        <p:cNvPr id="1" name=""/>
         <p:cNvGrpSpPr/>
         <p:nvPr/>
       </p:nvGrpSpPr>
@@ -8361,93 +8663,210 @@
       </p:grpSpPr>
       <p:sp>
         <p:nvSpPr>
-          <p:cNvPr id="97" name="Google Shape;97;p15"/>
-          <p:cNvSpPr txBox="1">
+          <p:cNvPr id="2" name="Title 1">
+            <a:extLst>
+              <a:ext uri="{FF2B5EF4-FFF2-40B4-BE49-F238E27FC236}">
+                <a16:creationId xmlns:a16="http://schemas.microsoft.com/office/drawing/2014/main" id="{024AD384-5AD1-4435-A943-1241B2FACD62}"/>
+              </a:ext>
+            </a:extLst>
+          </p:cNvPr>
+          <p:cNvSpPr>
             <a:spLocks noGrp="1"/>
           </p:cNvSpPr>
           <p:nvPr>
-            <p:ph type="ctrTitle"/>
+            <p:ph type="title"/>
+          </p:nvPr>
+        </p:nvSpPr>
+        <p:spPr/>
+        <p:txBody>
+          <a:bodyPr/>
+          <a:lstStyle/>
+          <a:p>
+            <a:r>
+              <a:rPr lang="en-US"/>
+              <a:t>Python If Statements</a:t>
+            </a:r>
+            <a:endParaRPr lang="fa-IR"/>
+          </a:p>
+        </p:txBody>
+      </p:sp>
+      <p:sp>
+        <p:nvSpPr>
+          <p:cNvPr id="3" name="Text Placeholder 2">
+            <a:extLst>
+              <a:ext uri="{FF2B5EF4-FFF2-40B4-BE49-F238E27FC236}">
+                <a16:creationId xmlns:a16="http://schemas.microsoft.com/office/drawing/2014/main" id="{58BE3078-8B89-4550-B497-93E4DADBD57E}"/>
+              </a:ext>
+            </a:extLst>
+          </p:cNvPr>
+          <p:cNvSpPr>
+            <a:spLocks noGrp="1"/>
+          </p:cNvSpPr>
+          <p:nvPr>
+            <p:ph type="body" idx="1"/>
           </p:nvPr>
         </p:nvSpPr>
         <p:spPr>
           <a:xfrm>
-            <a:off x="1655700" y="1991850"/>
-            <a:ext cx="5832600" cy="1159800"/>
+            <a:off x="786150" y="1142608"/>
+            <a:ext cx="7571700" cy="3626431"/>
           </a:xfrm>
-          <a:prstGeom prst="rect">
-            <a:avLst/>
-          </a:prstGeom>
         </p:spPr>
         <p:txBody>
-          <a:bodyPr spcFirstLastPara="1" wrap="square" lIns="91425" tIns="91425" rIns="91425" bIns="91425" anchor="ctr" anchorCtr="0">
-            <a:noAutofit/>
-          </a:bodyPr>
+          <a:bodyPr/>
           <a:lstStyle/>
           <a:p>
-            <a:pPr marL="0" lvl="0" indent="0" algn="ctr" rtl="0">
-              <a:spcBef>
-                <a:spcPts val="0"/>
-              </a:spcBef>
-              <a:spcAft>
-                <a:spcPts val="0"/>
-              </a:spcAft>
-              <a:buNone/>
-            </a:pPr>
-            <a:r>
-              <a:rPr lang="en-US" sz="6000">
-                <a:solidFill>
-                  <a:srgbClr val="E6E6E6"/>
-                </a:solidFill>
-              </a:rPr>
-              <a:t>3</a:t>
-            </a:r>
-            <a:endParaRPr sz="6000">
-              <a:solidFill>
-                <a:srgbClr val="E6E6E6"/>
-              </a:solidFill>
+            <a:pPr marL="76200" indent="0">
+              <a:buNone/>
+            </a:pPr>
+            <a:r>
+              <a:rPr lang="en-US" sz="1400"/>
+              <a:t>Shorthand if statement</a:t>
+            </a:r>
+          </a:p>
+          <a:p>
+            <a:pPr marL="76200" indent="0">
+              <a:buNone/>
+            </a:pPr>
+            <a:r>
+              <a:rPr lang="en-US" sz="1200">
+                <a:latin typeface="Consolas" panose="020B0609020204030204" pitchFamily="49" charset="0"/>
+                <a:cs typeface="Courier New" panose="02070309020205020404" pitchFamily="49" charset="0"/>
+              </a:rPr>
+              <a:t>a = 200</a:t>
+            </a:r>
+          </a:p>
+          <a:p>
+            <a:pPr marL="76200" indent="0">
+              <a:buNone/>
+            </a:pPr>
+            <a:r>
+              <a:rPr lang="en-US" sz="1200">
+                <a:latin typeface="Consolas" panose="020B0609020204030204" pitchFamily="49" charset="0"/>
+                <a:cs typeface="Courier New" panose="02070309020205020404" pitchFamily="49" charset="0"/>
+              </a:rPr>
+              <a:t>b = 33</a:t>
+            </a:r>
+            <a:endParaRPr lang="en-US" sz="1400">
+              <a:latin typeface="Consolas" panose="020B0609020204030204" pitchFamily="49" charset="0"/>
+              <a:cs typeface="Courier New" panose="02070309020205020404" pitchFamily="49" charset="0"/>
             </a:endParaRPr>
           </a:p>
           <a:p>
-            <a:pPr marL="0" lvl="0" indent="0" algn="ctr" rtl="0">
-              <a:spcBef>
-                <a:spcPts val="0"/>
-              </a:spcBef>
-              <a:spcAft>
-                <a:spcPts val="0"/>
-              </a:spcAft>
-              <a:buNone/>
-            </a:pPr>
-            <a:r>
-              <a:rPr lang="en"/>
-              <a:t>Pandas</a:t>
-            </a:r>
-            <a:endParaRPr/>
+            <a:pPr marL="76200" indent="0">
+              <a:buNone/>
+            </a:pPr>
+            <a:r>
+              <a:rPr lang="en-US" sz="1200">
+                <a:latin typeface="Consolas" panose="020B0609020204030204" pitchFamily="49" charset="0"/>
+                <a:cs typeface="Courier New" panose="02070309020205020404" pitchFamily="49" charset="0"/>
+              </a:rPr>
+              <a:t>print('a') if a &gt; b else print('b') if a &lt; b else print('=')</a:t>
+            </a:r>
+          </a:p>
+          <a:p>
+            <a:pPr marL="76200" indent="0">
+              <a:buNone/>
+            </a:pPr>
+            <a:endParaRPr lang="en-US" sz="1200">
+              <a:latin typeface="Consolas" panose="020B0609020204030204" pitchFamily="49" charset="0"/>
+              <a:cs typeface="Courier New" panose="02070309020205020404" pitchFamily="49" charset="0"/>
+            </a:endParaRPr>
+          </a:p>
+          <a:p>
+            <a:pPr marL="76200" indent="0">
+              <a:buNone/>
+            </a:pPr>
+            <a:r>
+              <a:rPr lang="en-US" sz="1400"/>
+              <a:t>Nested if</a:t>
+            </a:r>
+            <a:endParaRPr lang="en-US" sz="1200">
+              <a:latin typeface="Consolas" panose="020B0609020204030204" pitchFamily="49" charset="0"/>
+              <a:cs typeface="Courier New" panose="02070309020205020404" pitchFamily="49" charset="0"/>
+            </a:endParaRPr>
+          </a:p>
+          <a:p>
+            <a:pPr marL="76200" indent="0">
+              <a:buNone/>
+            </a:pPr>
+            <a:r>
+              <a:rPr lang="en-US" sz="1200">
+                <a:latin typeface="Consolas" panose="020B0609020204030204" pitchFamily="49" charset="0"/>
+                <a:cs typeface="Courier New" panose="02070309020205020404" pitchFamily="49" charset="0"/>
+              </a:rPr>
+              <a:t>x = 41</a:t>
+            </a:r>
+          </a:p>
+          <a:p>
+            <a:pPr marL="76200" indent="0">
+              <a:buNone/>
+            </a:pPr>
+            <a:r>
+              <a:rPr lang="en-US" sz="1200">
+                <a:latin typeface="Consolas" panose="020B0609020204030204" pitchFamily="49" charset="0"/>
+                <a:cs typeface="Courier New" panose="02070309020205020404" pitchFamily="49" charset="0"/>
+              </a:rPr>
+              <a:t>if x &gt; 10:</a:t>
+            </a:r>
+          </a:p>
+          <a:p>
+            <a:pPr marL="76200" indent="0">
+              <a:buNone/>
+            </a:pPr>
+            <a:r>
+              <a:rPr lang="en-US" sz="1200">
+                <a:latin typeface="Consolas" panose="020B0609020204030204" pitchFamily="49" charset="0"/>
+                <a:cs typeface="Courier New" panose="02070309020205020404" pitchFamily="49" charset="0"/>
+              </a:rPr>
+              <a:t>  print('Above ten ')</a:t>
+            </a:r>
+          </a:p>
+          <a:p>
+            <a:pPr marL="76200" indent="0">
+              <a:buNone/>
+            </a:pPr>
+            <a:r>
+              <a:rPr lang="en-US" sz="1200">
+                <a:latin typeface="Consolas" panose="020B0609020204030204" pitchFamily="49" charset="0"/>
+                <a:cs typeface="Courier New" panose="02070309020205020404" pitchFamily="49" charset="0"/>
+              </a:rPr>
+              <a:t>  if x &gt; 20:</a:t>
+            </a:r>
+          </a:p>
+          <a:p>
+            <a:pPr marL="76200" indent="0">
+              <a:buNone/>
+            </a:pPr>
+            <a:r>
+              <a:rPr lang="en-US" sz="1200">
+                <a:latin typeface="Consolas" panose="020B0609020204030204" pitchFamily="49" charset="0"/>
+                <a:cs typeface="Courier New" panose="02070309020205020404" pitchFamily="49" charset="0"/>
+              </a:rPr>
+              <a:t>    print("and also above 20!")</a:t>
+            </a:r>
           </a:p>
         </p:txBody>
       </p:sp>
       <p:sp>
         <p:nvSpPr>
-          <p:cNvPr id="99" name="Google Shape;99;p15"/>
-          <p:cNvSpPr txBox="1">
+          <p:cNvPr id="4" name="Slide Number Placeholder 3">
+            <a:extLst>
+              <a:ext uri="{FF2B5EF4-FFF2-40B4-BE49-F238E27FC236}">
+                <a16:creationId xmlns:a16="http://schemas.microsoft.com/office/drawing/2014/main" id="{64987AE6-EC0E-43DD-9376-95A5602EE5E1}"/>
+              </a:ext>
+            </a:extLst>
+          </p:cNvPr>
+          <p:cNvSpPr>
             <a:spLocks noGrp="1"/>
           </p:cNvSpPr>
           <p:nvPr>
-            <p:ph type="sldNum" idx="4294967295"/>
+            <p:ph type="sldNum" idx="12"/>
           </p:nvPr>
         </p:nvSpPr>
-        <p:spPr>
-          <a:xfrm>
-            <a:off x="8404384" y="4749851"/>
-            <a:ext cx="548700" cy="393600"/>
-          </a:xfrm>
-          <a:prstGeom prst="rect">
-            <a:avLst/>
-          </a:prstGeom>
-        </p:spPr>
+        <p:spPr/>
         <p:txBody>
-          <a:bodyPr spcFirstLastPara="1" wrap="square" lIns="91425" tIns="91425" rIns="91425" bIns="91425" anchor="t" anchorCtr="0">
-            <a:noAutofit/>
-          </a:bodyPr>
+          <a:bodyPr/>
           <a:lstStyle/>
           <a:p>
             <a:pPr marL="0" lvl="0" indent="0" algn="r" rtl="0">
@@ -8460,17 +8879,17 @@
               <a:buNone/>
             </a:pPr>
             <a:fld id="{00000000-1234-1234-1234-123412341234}" type="slidenum">
-              <a:rPr lang="en"/>
+              <a:rPr lang="en" smtClean="0"/>
               <a:t>19</a:t>
             </a:fld>
-            <a:endParaRPr/>
+            <a:endParaRPr lang="en"/>
           </a:p>
         </p:txBody>
       </p:sp>
     </p:spTree>
     <p:extLst>
       <p:ext uri="{BB962C8B-B14F-4D97-AF65-F5344CB8AC3E}">
-        <p14:creationId xmlns:p14="http://schemas.microsoft.com/office/powerpoint/2010/main" val="2729265455"/>
+        <p14:creationId xmlns:p14="http://schemas.microsoft.com/office/powerpoint/2010/main" val="3273535352"/>
       </p:ext>
     </p:extLst>
   </p:cSld>
@@ -8618,7 +9037,7 @@
   <p:cSld>
     <p:spTree>
       <p:nvGrpSpPr>
-        <p:cNvPr id="1" name="Shape 96"/>
+        <p:cNvPr id="1" name=""/>
         <p:cNvGrpSpPr/>
         <p:nvPr/>
       </p:nvGrpSpPr>
@@ -8632,93 +9051,169 @@
       </p:grpSpPr>
       <p:sp>
         <p:nvSpPr>
-          <p:cNvPr id="97" name="Google Shape;97;p15"/>
-          <p:cNvSpPr txBox="1">
+          <p:cNvPr id="2" name="Title 1">
+            <a:extLst>
+              <a:ext uri="{FF2B5EF4-FFF2-40B4-BE49-F238E27FC236}">
+                <a16:creationId xmlns:a16="http://schemas.microsoft.com/office/drawing/2014/main" id="{024AD384-5AD1-4435-A943-1241B2FACD62}"/>
+              </a:ext>
+            </a:extLst>
+          </p:cNvPr>
+          <p:cNvSpPr>
             <a:spLocks noGrp="1"/>
           </p:cNvSpPr>
           <p:nvPr>
-            <p:ph type="ctrTitle"/>
+            <p:ph type="title"/>
+          </p:nvPr>
+        </p:nvSpPr>
+        <p:spPr/>
+        <p:txBody>
+          <a:bodyPr/>
+          <a:lstStyle/>
+          <a:p>
+            <a:r>
+              <a:rPr lang="en-US"/>
+              <a:t>Python While Loops</a:t>
+            </a:r>
+            <a:endParaRPr lang="fa-IR"/>
+          </a:p>
+        </p:txBody>
+      </p:sp>
+      <p:sp>
+        <p:nvSpPr>
+          <p:cNvPr id="3" name="Text Placeholder 2">
+            <a:extLst>
+              <a:ext uri="{FF2B5EF4-FFF2-40B4-BE49-F238E27FC236}">
+                <a16:creationId xmlns:a16="http://schemas.microsoft.com/office/drawing/2014/main" id="{58BE3078-8B89-4550-B497-93E4DADBD57E}"/>
+              </a:ext>
+            </a:extLst>
+          </p:cNvPr>
+          <p:cNvSpPr>
+            <a:spLocks noGrp="1"/>
+          </p:cNvSpPr>
+          <p:nvPr>
+            <p:ph type="body" idx="1"/>
           </p:nvPr>
         </p:nvSpPr>
         <p:spPr>
           <a:xfrm>
-            <a:off x="1655700" y="1991850"/>
-            <a:ext cx="5832600" cy="1159800"/>
+            <a:off x="786150" y="1142608"/>
+            <a:ext cx="7571700" cy="3626431"/>
           </a:xfrm>
-          <a:prstGeom prst="rect">
-            <a:avLst/>
-          </a:prstGeom>
         </p:spPr>
         <p:txBody>
-          <a:bodyPr spcFirstLastPara="1" wrap="square" lIns="91425" tIns="91425" rIns="91425" bIns="91425" anchor="ctr" anchorCtr="0">
-            <a:noAutofit/>
-          </a:bodyPr>
+          <a:bodyPr/>
           <a:lstStyle/>
           <a:p>
-            <a:pPr marL="0" lvl="0" indent="0" algn="ctr" rtl="0">
-              <a:spcBef>
-                <a:spcPts val="0"/>
-              </a:spcBef>
-              <a:spcAft>
-                <a:spcPts val="0"/>
-              </a:spcAft>
-              <a:buNone/>
-            </a:pPr>
-            <a:r>
-              <a:rPr lang="en-US" sz="6000">
-                <a:solidFill>
-                  <a:srgbClr val="E6E6E6"/>
-                </a:solidFill>
-              </a:rPr>
-              <a:t>4</a:t>
-            </a:r>
-            <a:endParaRPr sz="6000">
-              <a:solidFill>
-                <a:srgbClr val="E6E6E6"/>
-              </a:solidFill>
+            <a:pPr marL="76200" indent="0">
+              <a:buNone/>
+            </a:pPr>
+            <a:r>
+              <a:rPr lang="en-US" sz="1400"/>
+              <a:t>Execute a set of statements as long as a condition is true</a:t>
+            </a:r>
+          </a:p>
+          <a:p>
+            <a:pPr marL="76200" indent="0">
+              <a:buNone/>
+            </a:pPr>
+            <a:r>
+              <a:rPr lang="nn-NO" sz="1200">
+                <a:latin typeface="Consolas" panose="020B0609020204030204" pitchFamily="49" charset="0"/>
+                <a:cs typeface="Courier New" panose="02070309020205020404" pitchFamily="49" charset="0"/>
+              </a:rPr>
+              <a:t>i = 1</a:t>
+            </a:r>
+          </a:p>
+          <a:p>
+            <a:pPr marL="76200" indent="0">
+              <a:buNone/>
+            </a:pPr>
+            <a:r>
+              <a:rPr lang="nn-NO" sz="1200">
+                <a:latin typeface="Consolas" panose="020B0609020204030204" pitchFamily="49" charset="0"/>
+                <a:cs typeface="Courier New" panose="02070309020205020404" pitchFamily="49" charset="0"/>
+              </a:rPr>
+              <a:t>while i &lt; 10:</a:t>
+            </a:r>
+          </a:p>
+          <a:p>
+            <a:pPr marL="76200" indent="0">
+              <a:buNone/>
+            </a:pPr>
+            <a:r>
+              <a:rPr lang="nn-NO" sz="1200">
+                <a:latin typeface="Consolas" panose="020B0609020204030204" pitchFamily="49" charset="0"/>
+                <a:cs typeface="Courier New" panose="02070309020205020404" pitchFamily="49" charset="0"/>
+              </a:rPr>
+              <a:t>    print(i)</a:t>
+            </a:r>
+          </a:p>
+          <a:p>
+            <a:pPr marL="76200" indent="0">
+              <a:buNone/>
+            </a:pPr>
+            <a:r>
+              <a:rPr lang="nn-NO" sz="1200">
+                <a:latin typeface="Consolas" panose="020B0609020204030204" pitchFamily="49" charset="0"/>
+                <a:cs typeface="Courier New" panose="02070309020205020404" pitchFamily="49" charset="0"/>
+              </a:rPr>
+              <a:t>    i += 1</a:t>
+            </a:r>
+          </a:p>
+          <a:p>
+            <a:pPr marL="76200" indent="0">
+              <a:buNone/>
+            </a:pPr>
+            <a:r>
+              <a:rPr lang="nn-NO" sz="1200">
+                <a:latin typeface="Consolas" panose="020B0609020204030204" pitchFamily="49" charset="0"/>
+                <a:cs typeface="Courier New" panose="02070309020205020404" pitchFamily="49" charset="0"/>
+              </a:rPr>
+              <a:t>else:</a:t>
+            </a:r>
+          </a:p>
+          <a:p>
+            <a:pPr marL="76200" indent="0">
+              <a:buNone/>
+            </a:pPr>
+            <a:r>
+              <a:rPr lang="nn-NO" sz="1200">
+                <a:latin typeface="Consolas" panose="020B0609020204030204" pitchFamily="49" charset="0"/>
+                <a:cs typeface="Courier New" panose="02070309020205020404" pitchFamily="49" charset="0"/>
+              </a:rPr>
+              <a:t>    print(f'Finished after {i} loops')</a:t>
+            </a:r>
+          </a:p>
+          <a:p>
+            <a:pPr marL="76200" indent="0">
+              <a:buNone/>
+            </a:pPr>
+            <a:endParaRPr lang="en-US" sz="1200">
+              <a:latin typeface="Consolas" panose="020B0609020204030204" pitchFamily="49" charset="0"/>
+              <a:cs typeface="Courier New" panose="02070309020205020404" pitchFamily="49" charset="0"/>
             </a:endParaRPr>
-          </a:p>
-          <a:p>
-            <a:pPr marL="0" lvl="0" indent="0" algn="ctr" rtl="0">
-              <a:spcBef>
-                <a:spcPts val="0"/>
-              </a:spcBef>
-              <a:spcAft>
-                <a:spcPts val="0"/>
-              </a:spcAft>
-              <a:buNone/>
-            </a:pPr>
-            <a:r>
-              <a:rPr lang="en"/>
-              <a:t>Matplotlib</a:t>
-            </a:r>
-            <a:endParaRPr/>
           </a:p>
         </p:txBody>
       </p:sp>
       <p:sp>
         <p:nvSpPr>
-          <p:cNvPr id="99" name="Google Shape;99;p15"/>
-          <p:cNvSpPr txBox="1">
+          <p:cNvPr id="4" name="Slide Number Placeholder 3">
+            <a:extLst>
+              <a:ext uri="{FF2B5EF4-FFF2-40B4-BE49-F238E27FC236}">
+                <a16:creationId xmlns:a16="http://schemas.microsoft.com/office/drawing/2014/main" id="{64987AE6-EC0E-43DD-9376-95A5602EE5E1}"/>
+              </a:ext>
+            </a:extLst>
+          </p:cNvPr>
+          <p:cNvSpPr>
             <a:spLocks noGrp="1"/>
           </p:cNvSpPr>
           <p:nvPr>
-            <p:ph type="sldNum" idx="4294967295"/>
+            <p:ph type="sldNum" idx="12"/>
           </p:nvPr>
         </p:nvSpPr>
-        <p:spPr>
-          <a:xfrm>
-            <a:off x="8404384" y="4749851"/>
-            <a:ext cx="548700" cy="393600"/>
-          </a:xfrm>
-          <a:prstGeom prst="rect">
-            <a:avLst/>
-          </a:prstGeom>
-        </p:spPr>
+        <p:spPr/>
         <p:txBody>
-          <a:bodyPr spcFirstLastPara="1" wrap="square" lIns="91425" tIns="91425" rIns="91425" bIns="91425" anchor="t" anchorCtr="0">
-            <a:noAutofit/>
-          </a:bodyPr>
+          <a:bodyPr/>
           <a:lstStyle/>
           <a:p>
             <a:pPr marL="0" lvl="0" indent="0" algn="r" rtl="0">
@@ -8731,17 +9226,17 @@
               <a:buNone/>
             </a:pPr>
             <a:fld id="{00000000-1234-1234-1234-123412341234}" type="slidenum">
-              <a:rPr lang="en"/>
+              <a:rPr lang="en" smtClean="0"/>
               <a:t>20</a:t>
             </a:fld>
-            <a:endParaRPr/>
+            <a:endParaRPr lang="en"/>
           </a:p>
         </p:txBody>
       </p:sp>
     </p:spTree>
     <p:extLst>
       <p:ext uri="{BB962C8B-B14F-4D97-AF65-F5344CB8AC3E}">
-        <p14:creationId xmlns:p14="http://schemas.microsoft.com/office/powerpoint/2010/main" val="2458102878"/>
+        <p14:creationId xmlns:p14="http://schemas.microsoft.com/office/powerpoint/2010/main" val="620167223"/>
       </p:ext>
     </p:extLst>
   </p:cSld>
@@ -8756,7 +9251,7 @@
   <p:cSld>
     <p:spTree>
       <p:nvGrpSpPr>
-        <p:cNvPr id="1" name="Shape 96"/>
+        <p:cNvPr id="1" name=""/>
         <p:cNvGrpSpPr/>
         <p:nvPr/>
       </p:nvGrpSpPr>
@@ -8770,88 +9265,212 @@
       </p:grpSpPr>
       <p:sp>
         <p:nvSpPr>
-          <p:cNvPr id="97" name="Google Shape;97;p15"/>
-          <p:cNvSpPr txBox="1">
+          <p:cNvPr id="2" name="Title 1">
+            <a:extLst>
+              <a:ext uri="{FF2B5EF4-FFF2-40B4-BE49-F238E27FC236}">
+                <a16:creationId xmlns:a16="http://schemas.microsoft.com/office/drawing/2014/main" id="{024AD384-5AD1-4435-A943-1241B2FACD62}"/>
+              </a:ext>
+            </a:extLst>
+          </p:cNvPr>
+          <p:cNvSpPr>
             <a:spLocks noGrp="1"/>
           </p:cNvSpPr>
           <p:nvPr>
-            <p:ph type="ctrTitle"/>
+            <p:ph type="title"/>
+          </p:nvPr>
+        </p:nvSpPr>
+        <p:spPr/>
+        <p:txBody>
+          <a:bodyPr/>
+          <a:lstStyle/>
+          <a:p>
+            <a:r>
+              <a:rPr lang="en-US"/>
+              <a:t>Python While Loops</a:t>
+            </a:r>
+            <a:endParaRPr lang="fa-IR"/>
+          </a:p>
+        </p:txBody>
+      </p:sp>
+      <p:sp>
+        <p:nvSpPr>
+          <p:cNvPr id="3" name="Text Placeholder 2">
+            <a:extLst>
+              <a:ext uri="{FF2B5EF4-FFF2-40B4-BE49-F238E27FC236}">
+                <a16:creationId xmlns:a16="http://schemas.microsoft.com/office/drawing/2014/main" id="{58BE3078-8B89-4550-B497-93E4DADBD57E}"/>
+              </a:ext>
+            </a:extLst>
+          </p:cNvPr>
+          <p:cNvSpPr>
+            <a:spLocks noGrp="1"/>
+          </p:cNvSpPr>
+          <p:nvPr>
+            <p:ph type="body" idx="1"/>
           </p:nvPr>
         </p:nvSpPr>
         <p:spPr>
           <a:xfrm>
-            <a:off x="1655700" y="1991850"/>
-            <a:ext cx="5832600" cy="1159800"/>
+            <a:off x="786150" y="1142608"/>
+            <a:ext cx="7571700" cy="3626431"/>
           </a:xfrm>
-          <a:prstGeom prst="rect">
-            <a:avLst/>
-          </a:prstGeom>
         </p:spPr>
         <p:txBody>
-          <a:bodyPr spcFirstLastPara="1" wrap="square" lIns="91425" tIns="91425" rIns="91425" bIns="91425" anchor="ctr" anchorCtr="0">
-            <a:noAutofit/>
-          </a:bodyPr>
+          <a:bodyPr/>
           <a:lstStyle/>
           <a:p>
-            <a:pPr marL="0" lvl="0" indent="0" algn="ctr" rtl="0">
-              <a:spcBef>
-                <a:spcPts val="0"/>
-              </a:spcBef>
-              <a:spcAft>
-                <a:spcPts val="0"/>
-              </a:spcAft>
-              <a:buNone/>
-            </a:pPr>
-            <a:r>
-              <a:rPr lang="en-US" sz="6000">
-                <a:solidFill>
-                  <a:srgbClr val="E6E6E6"/>
-                </a:solidFill>
-              </a:rPr>
-              <a:t>5</a:t>
-            </a:r>
-            <a:endParaRPr sz="6000">
-              <a:solidFill>
-                <a:srgbClr val="E6E6E6"/>
-              </a:solidFill>
+            <a:pPr marL="76200" indent="0">
+              <a:buNone/>
+            </a:pPr>
+            <a:r>
+              <a:rPr lang="en-US" sz="1400"/>
+              <a:t>Break and continue</a:t>
+            </a:r>
+            <a:endParaRPr lang="en-US" sz="1400">
+              <a:latin typeface="Consolas" panose="020B0609020204030204" pitchFamily="49" charset="0"/>
+              <a:cs typeface="Courier New" panose="02070309020205020404" pitchFamily="49" charset="0"/>
             </a:endParaRPr>
           </a:p>
           <a:p>
-            <a:r>
-              <a:rPr lang="en-US"/>
-              <a:t>S</a:t>
-            </a:r>
-            <a:r>
-              <a:rPr lang="en-US" b="1"/>
-              <a:t>cikit-learn</a:t>
-            </a:r>
-            <a:endParaRPr/>
+            <a:pPr marL="76200" indent="0">
+              <a:buNone/>
+            </a:pPr>
+            <a:r>
+              <a:rPr lang="en-US" sz="1200">
+                <a:latin typeface="Consolas" panose="020B0609020204030204" pitchFamily="49" charset="0"/>
+                <a:cs typeface="Courier New" panose="02070309020205020404" pitchFamily="49" charset="0"/>
+              </a:rPr>
+              <a:t>i = 0</a:t>
+            </a:r>
+          </a:p>
+          <a:p>
+            <a:pPr marL="76200" indent="0">
+              <a:buNone/>
+            </a:pPr>
+            <a:r>
+              <a:rPr lang="en-US" sz="1200">
+                <a:latin typeface="Consolas" panose="020B0609020204030204" pitchFamily="49" charset="0"/>
+                <a:cs typeface="Courier New" panose="02070309020205020404" pitchFamily="49" charset="0"/>
+              </a:rPr>
+              <a:t>while i &lt; 10:</a:t>
+            </a:r>
+          </a:p>
+          <a:p>
+            <a:pPr marL="76200" indent="0">
+              <a:buNone/>
+            </a:pPr>
+            <a:r>
+              <a:rPr lang="en-US" sz="1200">
+                <a:latin typeface="Consolas" panose="020B0609020204030204" pitchFamily="49" charset="0"/>
+                <a:cs typeface="Courier New" panose="02070309020205020404" pitchFamily="49" charset="0"/>
+              </a:rPr>
+              <a:t>    i += 1</a:t>
+            </a:r>
+          </a:p>
+          <a:p>
+            <a:pPr marL="76200" indent="0">
+              <a:buNone/>
+            </a:pPr>
+            <a:r>
+              <a:rPr lang="en-US" sz="1200">
+                <a:latin typeface="Consolas" panose="020B0609020204030204" pitchFamily="49" charset="0"/>
+                <a:cs typeface="Courier New" panose="02070309020205020404" pitchFamily="49" charset="0"/>
+              </a:rPr>
+              <a:t>    if i == 2:</a:t>
+            </a:r>
+          </a:p>
+          <a:p>
+            <a:pPr marL="76200" indent="0">
+              <a:buNone/>
+            </a:pPr>
+            <a:r>
+              <a:rPr lang="en-US" sz="1200">
+                <a:latin typeface="Consolas" panose="020B0609020204030204" pitchFamily="49" charset="0"/>
+                <a:cs typeface="Courier New" panose="02070309020205020404" pitchFamily="49" charset="0"/>
+              </a:rPr>
+              <a:t>        continue</a:t>
+            </a:r>
+          </a:p>
+          <a:p>
+            <a:pPr marL="76200" indent="0">
+              <a:buNone/>
+            </a:pPr>
+            <a:r>
+              <a:rPr lang="en-US" sz="1200">
+                <a:latin typeface="Consolas" panose="020B0609020204030204" pitchFamily="49" charset="0"/>
+                <a:cs typeface="Courier New" panose="02070309020205020404" pitchFamily="49" charset="0"/>
+              </a:rPr>
+              <a:t>    if i == 5:</a:t>
+            </a:r>
+          </a:p>
+          <a:p>
+            <a:pPr marL="76200" indent="0">
+              <a:buNone/>
+            </a:pPr>
+            <a:r>
+              <a:rPr lang="en-US" sz="1200">
+                <a:latin typeface="Consolas" panose="020B0609020204030204" pitchFamily="49" charset="0"/>
+                <a:cs typeface="Courier New" panose="02070309020205020404" pitchFamily="49" charset="0"/>
+              </a:rPr>
+              <a:t>        break</a:t>
+            </a:r>
+          </a:p>
+          <a:p>
+            <a:pPr marL="76200" indent="0">
+              <a:buNone/>
+            </a:pPr>
+            <a:r>
+              <a:rPr lang="en-US" sz="1200">
+                <a:latin typeface="Consolas" panose="020B0609020204030204" pitchFamily="49" charset="0"/>
+                <a:cs typeface="Courier New" panose="02070309020205020404" pitchFamily="49" charset="0"/>
+              </a:rPr>
+              <a:t>    print(i)</a:t>
+            </a:r>
+          </a:p>
+          <a:p>
+            <a:pPr marL="76200" indent="0">
+              <a:buNone/>
+            </a:pPr>
+            <a:r>
+              <a:rPr lang="nn-NO" sz="1200">
+                <a:latin typeface="Consolas" panose="020B0609020204030204" pitchFamily="49" charset="0"/>
+                <a:cs typeface="Courier New" panose="02070309020205020404" pitchFamily="49" charset="0"/>
+              </a:rPr>
+              <a:t>else:</a:t>
+            </a:r>
+          </a:p>
+          <a:p>
+            <a:pPr marL="76200" indent="0">
+              <a:buNone/>
+            </a:pPr>
+            <a:r>
+              <a:rPr lang="nn-NO" sz="1200">
+                <a:latin typeface="Consolas" panose="020B0609020204030204" pitchFamily="49" charset="0"/>
+                <a:cs typeface="Courier New" panose="02070309020205020404" pitchFamily="49" charset="0"/>
+              </a:rPr>
+              <a:t>    print(f'Finished after {i} loops')</a:t>
+            </a:r>
           </a:p>
         </p:txBody>
       </p:sp>
       <p:sp>
         <p:nvSpPr>
-          <p:cNvPr id="99" name="Google Shape;99;p15"/>
-          <p:cNvSpPr txBox="1">
+          <p:cNvPr id="4" name="Slide Number Placeholder 3">
+            <a:extLst>
+              <a:ext uri="{FF2B5EF4-FFF2-40B4-BE49-F238E27FC236}">
+                <a16:creationId xmlns:a16="http://schemas.microsoft.com/office/drawing/2014/main" id="{64987AE6-EC0E-43DD-9376-95A5602EE5E1}"/>
+              </a:ext>
+            </a:extLst>
+          </p:cNvPr>
+          <p:cNvSpPr>
             <a:spLocks noGrp="1"/>
           </p:cNvSpPr>
           <p:nvPr>
-            <p:ph type="sldNum" idx="4294967295"/>
+            <p:ph type="sldNum" idx="12"/>
           </p:nvPr>
         </p:nvSpPr>
-        <p:spPr>
-          <a:xfrm>
-            <a:off x="8404384" y="4749851"/>
-            <a:ext cx="548700" cy="393600"/>
-          </a:xfrm>
-          <a:prstGeom prst="rect">
-            <a:avLst/>
-          </a:prstGeom>
-        </p:spPr>
+        <p:spPr/>
         <p:txBody>
-          <a:bodyPr spcFirstLastPara="1" wrap="square" lIns="91425" tIns="91425" rIns="91425" bIns="91425" anchor="t" anchorCtr="0">
-            <a:noAutofit/>
-          </a:bodyPr>
+          <a:bodyPr/>
           <a:lstStyle/>
           <a:p>
             <a:pPr marL="0" lvl="0" indent="0" algn="r" rtl="0">
@@ -8864,17 +9483,17 @@
               <a:buNone/>
             </a:pPr>
             <a:fld id="{00000000-1234-1234-1234-123412341234}" type="slidenum">
-              <a:rPr lang="en"/>
+              <a:rPr lang="en" smtClean="0"/>
               <a:t>21</a:t>
             </a:fld>
-            <a:endParaRPr/>
+            <a:endParaRPr lang="en"/>
           </a:p>
         </p:txBody>
       </p:sp>
     </p:spTree>
     <p:extLst>
       <p:ext uri="{BB962C8B-B14F-4D97-AF65-F5344CB8AC3E}">
-        <p14:creationId xmlns:p14="http://schemas.microsoft.com/office/powerpoint/2010/main" val="3753200419"/>
+        <p14:creationId xmlns:p14="http://schemas.microsoft.com/office/powerpoint/2010/main" val="3595964566"/>
       </p:ext>
     </p:extLst>
   </p:cSld>
@@ -8941,7 +9560,7 @@
                   <a:srgbClr val="E6E6E6"/>
                 </a:solidFill>
               </a:rPr>
-              <a:t>6</a:t>
+              <a:t>2</a:t>
             </a:r>
             <a:endParaRPr sz="6000">
               <a:solidFill>
@@ -8950,11 +9569,18 @@
             </a:endParaRPr>
           </a:p>
           <a:p>
-            <a:r>
-              <a:rPr lang="en-US">
-                <a:effectLst/>
-              </a:rPr>
-              <a:t>Web Scraping</a:t>
+            <a:pPr marL="0" lvl="0" indent="0" algn="ctr" rtl="0">
+              <a:spcBef>
+                <a:spcPts val="0"/>
+              </a:spcBef>
+              <a:spcAft>
+                <a:spcPts val="0"/>
+              </a:spcAft>
+              <a:buNone/>
+            </a:pPr>
+            <a:r>
+              <a:rPr lang="en"/>
+              <a:t>NumPy</a:t>
             </a:r>
             <a:endParaRPr/>
           </a:p>
@@ -9005,6 +9631,686 @@
     </p:spTree>
     <p:extLst>
       <p:ext uri="{BB962C8B-B14F-4D97-AF65-F5344CB8AC3E}">
+        <p14:creationId xmlns:p14="http://schemas.microsoft.com/office/powerpoint/2010/main" val="1620004517"/>
+      </p:ext>
+    </p:extLst>
+  </p:cSld>
+  <p:clrMapOvr>
+    <a:masterClrMapping/>
+  </p:clrMapOvr>
+</p:sld>
+</file>
+
+<file path=ppt/slides/slide23.xml><?xml version="1.0" encoding="utf-8"?>
+<p:sld xmlns:a="http://schemas.openxmlformats.org/drawingml/2006/main" xmlns:r="http://schemas.openxmlformats.org/officeDocument/2006/relationships" xmlns:p="http://schemas.openxmlformats.org/presentationml/2006/main">
+  <p:cSld>
+    <p:spTree>
+      <p:nvGrpSpPr>
+        <p:cNvPr id="1" name=""/>
+        <p:cNvGrpSpPr/>
+        <p:nvPr/>
+      </p:nvGrpSpPr>
+      <p:grpSpPr>
+        <a:xfrm>
+          <a:off x="0" y="0"/>
+          <a:ext cx="0" cy="0"/>
+          <a:chOff x="0" y="0"/>
+          <a:chExt cx="0" cy="0"/>
+        </a:xfrm>
+      </p:grpSpPr>
+      <p:sp>
+        <p:nvSpPr>
+          <p:cNvPr id="2" name="Title 1">
+            <a:extLst>
+              <a:ext uri="{FF2B5EF4-FFF2-40B4-BE49-F238E27FC236}">
+                <a16:creationId xmlns:a16="http://schemas.microsoft.com/office/drawing/2014/main" id="{024AD384-5AD1-4435-A943-1241B2FACD62}"/>
+              </a:ext>
+            </a:extLst>
+          </p:cNvPr>
+          <p:cNvSpPr>
+            <a:spLocks noGrp="1"/>
+          </p:cNvSpPr>
+          <p:nvPr>
+            <p:ph type="title"/>
+          </p:nvPr>
+        </p:nvSpPr>
+        <p:spPr/>
+        <p:txBody>
+          <a:bodyPr/>
+          <a:lstStyle/>
+          <a:p>
+            <a:r>
+              <a:rPr lang="en-US" err="1"/>
+              <a:t>Numpy</a:t>
+            </a:r>
+            <a:r>
+              <a:rPr lang="en-US"/>
+              <a:t> Introduction</a:t>
+            </a:r>
+            <a:endParaRPr lang="fa-IR"/>
+          </a:p>
+        </p:txBody>
+      </p:sp>
+      <p:sp>
+        <p:nvSpPr>
+          <p:cNvPr id="3" name="Text Placeholder 2">
+            <a:extLst>
+              <a:ext uri="{FF2B5EF4-FFF2-40B4-BE49-F238E27FC236}">
+                <a16:creationId xmlns:a16="http://schemas.microsoft.com/office/drawing/2014/main" id="{58BE3078-8B89-4550-B497-93E4DADBD57E}"/>
+              </a:ext>
+            </a:extLst>
+          </p:cNvPr>
+          <p:cNvSpPr>
+            <a:spLocks noGrp="1"/>
+          </p:cNvSpPr>
+          <p:nvPr>
+            <p:ph type="body" idx="1"/>
+          </p:nvPr>
+        </p:nvSpPr>
+        <p:spPr>
+          <a:xfrm>
+            <a:off x="786150" y="1142608"/>
+            <a:ext cx="7571700" cy="3626431"/>
+          </a:xfrm>
+        </p:spPr>
+        <p:txBody>
+          <a:bodyPr/>
+          <a:lstStyle/>
+          <a:p>
+            <a:r>
+              <a:rPr lang="en-US" sz="1800"/>
+              <a:t>NumPy is a Python library used for working with arrays.</a:t>
+            </a:r>
+          </a:p>
+          <a:p>
+            <a:r>
+              <a:rPr lang="en-US" sz="1800"/>
+              <a:t>NumPy is short for "Numerical Python".</a:t>
+            </a:r>
+          </a:p>
+        </p:txBody>
+      </p:sp>
+      <p:sp>
+        <p:nvSpPr>
+          <p:cNvPr id="4" name="Slide Number Placeholder 3">
+            <a:extLst>
+              <a:ext uri="{FF2B5EF4-FFF2-40B4-BE49-F238E27FC236}">
+                <a16:creationId xmlns:a16="http://schemas.microsoft.com/office/drawing/2014/main" id="{64987AE6-EC0E-43DD-9376-95A5602EE5E1}"/>
+              </a:ext>
+            </a:extLst>
+          </p:cNvPr>
+          <p:cNvSpPr>
+            <a:spLocks noGrp="1"/>
+          </p:cNvSpPr>
+          <p:nvPr>
+            <p:ph type="sldNum" idx="12"/>
+          </p:nvPr>
+        </p:nvSpPr>
+        <p:spPr/>
+        <p:txBody>
+          <a:bodyPr/>
+          <a:lstStyle/>
+          <a:p>
+            <a:pPr marL="0" lvl="0" indent="0" algn="r" rtl="0">
+              <a:spcBef>
+                <a:spcPts val="0"/>
+              </a:spcBef>
+              <a:spcAft>
+                <a:spcPts val="0"/>
+              </a:spcAft>
+              <a:buNone/>
+            </a:pPr>
+            <a:fld id="{00000000-1234-1234-1234-123412341234}" type="slidenum">
+              <a:rPr lang="en" smtClean="0"/>
+              <a:t>23</a:t>
+            </a:fld>
+            <a:endParaRPr lang="en"/>
+          </a:p>
+        </p:txBody>
+      </p:sp>
+    </p:spTree>
+    <p:extLst>
+      <p:ext uri="{BB962C8B-B14F-4D97-AF65-F5344CB8AC3E}">
+        <p14:creationId xmlns:p14="http://schemas.microsoft.com/office/powerpoint/2010/main" val="4156460407"/>
+      </p:ext>
+    </p:extLst>
+  </p:cSld>
+  <p:clrMapOvr>
+    <a:masterClrMapping/>
+  </p:clrMapOvr>
+</p:sld>
+</file>
+
+<file path=ppt/slides/slide24.xml><?xml version="1.0" encoding="utf-8"?>
+<p:sld xmlns:a="http://schemas.openxmlformats.org/drawingml/2006/main" xmlns:r="http://schemas.openxmlformats.org/officeDocument/2006/relationships" xmlns:p="http://schemas.openxmlformats.org/presentationml/2006/main">
+  <p:cSld>
+    <p:spTree>
+      <p:nvGrpSpPr>
+        <p:cNvPr id="1" name="Shape 96"/>
+        <p:cNvGrpSpPr/>
+        <p:nvPr/>
+      </p:nvGrpSpPr>
+      <p:grpSpPr>
+        <a:xfrm>
+          <a:off x="0" y="0"/>
+          <a:ext cx="0" cy="0"/>
+          <a:chOff x="0" y="0"/>
+          <a:chExt cx="0" cy="0"/>
+        </a:xfrm>
+      </p:grpSpPr>
+      <p:sp>
+        <p:nvSpPr>
+          <p:cNvPr id="97" name="Google Shape;97;p15"/>
+          <p:cNvSpPr txBox="1">
+            <a:spLocks noGrp="1"/>
+          </p:cNvSpPr>
+          <p:nvPr>
+            <p:ph type="ctrTitle"/>
+          </p:nvPr>
+        </p:nvSpPr>
+        <p:spPr>
+          <a:xfrm>
+            <a:off x="1655700" y="1991850"/>
+            <a:ext cx="5832600" cy="1159800"/>
+          </a:xfrm>
+          <a:prstGeom prst="rect">
+            <a:avLst/>
+          </a:prstGeom>
+        </p:spPr>
+        <p:txBody>
+          <a:bodyPr spcFirstLastPara="1" wrap="square" lIns="91425" tIns="91425" rIns="91425" bIns="91425" anchor="ctr" anchorCtr="0">
+            <a:noAutofit/>
+          </a:bodyPr>
+          <a:lstStyle/>
+          <a:p>
+            <a:pPr marL="0" lvl="0" indent="0" algn="ctr" rtl="0">
+              <a:spcBef>
+                <a:spcPts val="0"/>
+              </a:spcBef>
+              <a:spcAft>
+                <a:spcPts val="0"/>
+              </a:spcAft>
+              <a:buNone/>
+            </a:pPr>
+            <a:r>
+              <a:rPr lang="en-US" sz="6000">
+                <a:solidFill>
+                  <a:srgbClr val="E6E6E6"/>
+                </a:solidFill>
+              </a:rPr>
+              <a:t>3</a:t>
+            </a:r>
+            <a:endParaRPr sz="6000">
+              <a:solidFill>
+                <a:srgbClr val="E6E6E6"/>
+              </a:solidFill>
+            </a:endParaRPr>
+          </a:p>
+          <a:p>
+            <a:pPr marL="0" lvl="0" indent="0" algn="ctr" rtl="0">
+              <a:spcBef>
+                <a:spcPts val="0"/>
+              </a:spcBef>
+              <a:spcAft>
+                <a:spcPts val="0"/>
+              </a:spcAft>
+              <a:buNone/>
+            </a:pPr>
+            <a:r>
+              <a:rPr lang="en"/>
+              <a:t>Pandas</a:t>
+            </a:r>
+            <a:endParaRPr/>
+          </a:p>
+        </p:txBody>
+      </p:sp>
+      <p:sp>
+        <p:nvSpPr>
+          <p:cNvPr id="99" name="Google Shape;99;p15"/>
+          <p:cNvSpPr txBox="1">
+            <a:spLocks noGrp="1"/>
+          </p:cNvSpPr>
+          <p:nvPr>
+            <p:ph type="sldNum" idx="4294967295"/>
+          </p:nvPr>
+        </p:nvSpPr>
+        <p:spPr>
+          <a:xfrm>
+            <a:off x="8404384" y="4749851"/>
+            <a:ext cx="548700" cy="393600"/>
+          </a:xfrm>
+          <a:prstGeom prst="rect">
+            <a:avLst/>
+          </a:prstGeom>
+        </p:spPr>
+        <p:txBody>
+          <a:bodyPr spcFirstLastPara="1" wrap="square" lIns="91425" tIns="91425" rIns="91425" bIns="91425" anchor="t" anchorCtr="0">
+            <a:noAutofit/>
+          </a:bodyPr>
+          <a:lstStyle/>
+          <a:p>
+            <a:pPr marL="0" lvl="0" indent="0" algn="r" rtl="0">
+              <a:spcBef>
+                <a:spcPts val="0"/>
+              </a:spcBef>
+              <a:spcAft>
+                <a:spcPts val="0"/>
+              </a:spcAft>
+              <a:buNone/>
+            </a:pPr>
+            <a:fld id="{00000000-1234-1234-1234-123412341234}" type="slidenum">
+              <a:rPr lang="en"/>
+              <a:t>24</a:t>
+            </a:fld>
+            <a:endParaRPr/>
+          </a:p>
+        </p:txBody>
+      </p:sp>
+    </p:spTree>
+    <p:extLst>
+      <p:ext uri="{BB962C8B-B14F-4D97-AF65-F5344CB8AC3E}">
+        <p14:creationId xmlns:p14="http://schemas.microsoft.com/office/powerpoint/2010/main" val="2729265455"/>
+      </p:ext>
+    </p:extLst>
+  </p:cSld>
+  <p:clrMapOvr>
+    <a:masterClrMapping/>
+  </p:clrMapOvr>
+</p:sld>
+</file>
+
+<file path=ppt/slides/slide25.xml><?xml version="1.0" encoding="utf-8"?>
+<p:sld xmlns:a="http://schemas.openxmlformats.org/drawingml/2006/main" xmlns:r="http://schemas.openxmlformats.org/officeDocument/2006/relationships" xmlns:p="http://schemas.openxmlformats.org/presentationml/2006/main">
+  <p:cSld>
+    <p:spTree>
+      <p:nvGrpSpPr>
+        <p:cNvPr id="1" name="Shape 96"/>
+        <p:cNvGrpSpPr/>
+        <p:nvPr/>
+      </p:nvGrpSpPr>
+      <p:grpSpPr>
+        <a:xfrm>
+          <a:off x="0" y="0"/>
+          <a:ext cx="0" cy="0"/>
+          <a:chOff x="0" y="0"/>
+          <a:chExt cx="0" cy="0"/>
+        </a:xfrm>
+      </p:grpSpPr>
+      <p:sp>
+        <p:nvSpPr>
+          <p:cNvPr id="97" name="Google Shape;97;p15"/>
+          <p:cNvSpPr txBox="1">
+            <a:spLocks noGrp="1"/>
+          </p:cNvSpPr>
+          <p:nvPr>
+            <p:ph type="ctrTitle"/>
+          </p:nvPr>
+        </p:nvSpPr>
+        <p:spPr>
+          <a:xfrm>
+            <a:off x="1655700" y="1991850"/>
+            <a:ext cx="5832600" cy="1159800"/>
+          </a:xfrm>
+          <a:prstGeom prst="rect">
+            <a:avLst/>
+          </a:prstGeom>
+        </p:spPr>
+        <p:txBody>
+          <a:bodyPr spcFirstLastPara="1" wrap="square" lIns="91425" tIns="91425" rIns="91425" bIns="91425" anchor="ctr" anchorCtr="0">
+            <a:noAutofit/>
+          </a:bodyPr>
+          <a:lstStyle/>
+          <a:p>
+            <a:pPr marL="0" lvl="0" indent="0" algn="ctr" rtl="0">
+              <a:spcBef>
+                <a:spcPts val="0"/>
+              </a:spcBef>
+              <a:spcAft>
+                <a:spcPts val="0"/>
+              </a:spcAft>
+              <a:buNone/>
+            </a:pPr>
+            <a:r>
+              <a:rPr lang="en-US" sz="6000">
+                <a:solidFill>
+                  <a:srgbClr val="E6E6E6"/>
+                </a:solidFill>
+              </a:rPr>
+              <a:t>4</a:t>
+            </a:r>
+            <a:endParaRPr sz="6000">
+              <a:solidFill>
+                <a:srgbClr val="E6E6E6"/>
+              </a:solidFill>
+            </a:endParaRPr>
+          </a:p>
+          <a:p>
+            <a:pPr marL="0" lvl="0" indent="0" algn="ctr" rtl="0">
+              <a:spcBef>
+                <a:spcPts val="0"/>
+              </a:spcBef>
+              <a:spcAft>
+                <a:spcPts val="0"/>
+              </a:spcAft>
+              <a:buNone/>
+            </a:pPr>
+            <a:r>
+              <a:rPr lang="en"/>
+              <a:t>Matplotlib</a:t>
+            </a:r>
+            <a:endParaRPr/>
+          </a:p>
+        </p:txBody>
+      </p:sp>
+      <p:sp>
+        <p:nvSpPr>
+          <p:cNvPr id="99" name="Google Shape;99;p15"/>
+          <p:cNvSpPr txBox="1">
+            <a:spLocks noGrp="1"/>
+          </p:cNvSpPr>
+          <p:nvPr>
+            <p:ph type="sldNum" idx="4294967295"/>
+          </p:nvPr>
+        </p:nvSpPr>
+        <p:spPr>
+          <a:xfrm>
+            <a:off x="8404384" y="4749851"/>
+            <a:ext cx="548700" cy="393600"/>
+          </a:xfrm>
+          <a:prstGeom prst="rect">
+            <a:avLst/>
+          </a:prstGeom>
+        </p:spPr>
+        <p:txBody>
+          <a:bodyPr spcFirstLastPara="1" wrap="square" lIns="91425" tIns="91425" rIns="91425" bIns="91425" anchor="t" anchorCtr="0">
+            <a:noAutofit/>
+          </a:bodyPr>
+          <a:lstStyle/>
+          <a:p>
+            <a:pPr marL="0" lvl="0" indent="0" algn="r" rtl="0">
+              <a:spcBef>
+                <a:spcPts val="0"/>
+              </a:spcBef>
+              <a:spcAft>
+                <a:spcPts val="0"/>
+              </a:spcAft>
+              <a:buNone/>
+            </a:pPr>
+            <a:fld id="{00000000-1234-1234-1234-123412341234}" type="slidenum">
+              <a:rPr lang="en"/>
+              <a:t>25</a:t>
+            </a:fld>
+            <a:endParaRPr/>
+          </a:p>
+        </p:txBody>
+      </p:sp>
+    </p:spTree>
+    <p:extLst>
+      <p:ext uri="{BB962C8B-B14F-4D97-AF65-F5344CB8AC3E}">
+        <p14:creationId xmlns:p14="http://schemas.microsoft.com/office/powerpoint/2010/main" val="2458102878"/>
+      </p:ext>
+    </p:extLst>
+  </p:cSld>
+  <p:clrMapOvr>
+    <a:masterClrMapping/>
+  </p:clrMapOvr>
+</p:sld>
+</file>
+
+<file path=ppt/slides/slide26.xml><?xml version="1.0" encoding="utf-8"?>
+<p:sld xmlns:a="http://schemas.openxmlformats.org/drawingml/2006/main" xmlns:r="http://schemas.openxmlformats.org/officeDocument/2006/relationships" xmlns:p="http://schemas.openxmlformats.org/presentationml/2006/main">
+  <p:cSld>
+    <p:spTree>
+      <p:nvGrpSpPr>
+        <p:cNvPr id="1" name="Shape 96"/>
+        <p:cNvGrpSpPr/>
+        <p:nvPr/>
+      </p:nvGrpSpPr>
+      <p:grpSpPr>
+        <a:xfrm>
+          <a:off x="0" y="0"/>
+          <a:ext cx="0" cy="0"/>
+          <a:chOff x="0" y="0"/>
+          <a:chExt cx="0" cy="0"/>
+        </a:xfrm>
+      </p:grpSpPr>
+      <p:sp>
+        <p:nvSpPr>
+          <p:cNvPr id="97" name="Google Shape;97;p15"/>
+          <p:cNvSpPr txBox="1">
+            <a:spLocks noGrp="1"/>
+          </p:cNvSpPr>
+          <p:nvPr>
+            <p:ph type="ctrTitle"/>
+          </p:nvPr>
+        </p:nvSpPr>
+        <p:spPr>
+          <a:xfrm>
+            <a:off x="1655700" y="1991850"/>
+            <a:ext cx="5832600" cy="1159800"/>
+          </a:xfrm>
+          <a:prstGeom prst="rect">
+            <a:avLst/>
+          </a:prstGeom>
+        </p:spPr>
+        <p:txBody>
+          <a:bodyPr spcFirstLastPara="1" wrap="square" lIns="91425" tIns="91425" rIns="91425" bIns="91425" anchor="ctr" anchorCtr="0">
+            <a:noAutofit/>
+          </a:bodyPr>
+          <a:lstStyle/>
+          <a:p>
+            <a:pPr marL="0" lvl="0" indent="0" algn="ctr" rtl="0">
+              <a:spcBef>
+                <a:spcPts val="0"/>
+              </a:spcBef>
+              <a:spcAft>
+                <a:spcPts val="0"/>
+              </a:spcAft>
+              <a:buNone/>
+            </a:pPr>
+            <a:r>
+              <a:rPr lang="en-US" sz="6000">
+                <a:solidFill>
+                  <a:srgbClr val="E6E6E6"/>
+                </a:solidFill>
+              </a:rPr>
+              <a:t>5</a:t>
+            </a:r>
+            <a:endParaRPr sz="6000">
+              <a:solidFill>
+                <a:srgbClr val="E6E6E6"/>
+              </a:solidFill>
+            </a:endParaRPr>
+          </a:p>
+          <a:p>
+            <a:r>
+              <a:rPr lang="en-US"/>
+              <a:t>S</a:t>
+            </a:r>
+            <a:r>
+              <a:rPr lang="en-US" b="1"/>
+              <a:t>cikit-learn</a:t>
+            </a:r>
+            <a:endParaRPr/>
+          </a:p>
+        </p:txBody>
+      </p:sp>
+      <p:sp>
+        <p:nvSpPr>
+          <p:cNvPr id="99" name="Google Shape;99;p15"/>
+          <p:cNvSpPr txBox="1">
+            <a:spLocks noGrp="1"/>
+          </p:cNvSpPr>
+          <p:nvPr>
+            <p:ph type="sldNum" idx="4294967295"/>
+          </p:nvPr>
+        </p:nvSpPr>
+        <p:spPr>
+          <a:xfrm>
+            <a:off x="8404384" y="4749851"/>
+            <a:ext cx="548700" cy="393600"/>
+          </a:xfrm>
+          <a:prstGeom prst="rect">
+            <a:avLst/>
+          </a:prstGeom>
+        </p:spPr>
+        <p:txBody>
+          <a:bodyPr spcFirstLastPara="1" wrap="square" lIns="91425" tIns="91425" rIns="91425" bIns="91425" anchor="t" anchorCtr="0">
+            <a:noAutofit/>
+          </a:bodyPr>
+          <a:lstStyle/>
+          <a:p>
+            <a:pPr marL="0" lvl="0" indent="0" algn="r" rtl="0">
+              <a:spcBef>
+                <a:spcPts val="0"/>
+              </a:spcBef>
+              <a:spcAft>
+                <a:spcPts val="0"/>
+              </a:spcAft>
+              <a:buNone/>
+            </a:pPr>
+            <a:fld id="{00000000-1234-1234-1234-123412341234}" type="slidenum">
+              <a:rPr lang="en"/>
+              <a:t>26</a:t>
+            </a:fld>
+            <a:endParaRPr/>
+          </a:p>
+        </p:txBody>
+      </p:sp>
+    </p:spTree>
+    <p:extLst>
+      <p:ext uri="{BB962C8B-B14F-4D97-AF65-F5344CB8AC3E}">
+        <p14:creationId xmlns:p14="http://schemas.microsoft.com/office/powerpoint/2010/main" val="3753200419"/>
+      </p:ext>
+    </p:extLst>
+  </p:cSld>
+  <p:clrMapOvr>
+    <a:masterClrMapping/>
+  </p:clrMapOvr>
+</p:sld>
+</file>
+
+<file path=ppt/slides/slide27.xml><?xml version="1.0" encoding="utf-8"?>
+<p:sld xmlns:a="http://schemas.openxmlformats.org/drawingml/2006/main" xmlns:r="http://schemas.openxmlformats.org/officeDocument/2006/relationships" xmlns:p="http://schemas.openxmlformats.org/presentationml/2006/main">
+  <p:cSld>
+    <p:spTree>
+      <p:nvGrpSpPr>
+        <p:cNvPr id="1" name="Shape 96"/>
+        <p:cNvGrpSpPr/>
+        <p:nvPr/>
+      </p:nvGrpSpPr>
+      <p:grpSpPr>
+        <a:xfrm>
+          <a:off x="0" y="0"/>
+          <a:ext cx="0" cy="0"/>
+          <a:chOff x="0" y="0"/>
+          <a:chExt cx="0" cy="0"/>
+        </a:xfrm>
+      </p:grpSpPr>
+      <p:sp>
+        <p:nvSpPr>
+          <p:cNvPr id="97" name="Google Shape;97;p15"/>
+          <p:cNvSpPr txBox="1">
+            <a:spLocks noGrp="1"/>
+          </p:cNvSpPr>
+          <p:nvPr>
+            <p:ph type="ctrTitle"/>
+          </p:nvPr>
+        </p:nvSpPr>
+        <p:spPr>
+          <a:xfrm>
+            <a:off x="1655700" y="1991850"/>
+            <a:ext cx="5832600" cy="1159800"/>
+          </a:xfrm>
+          <a:prstGeom prst="rect">
+            <a:avLst/>
+          </a:prstGeom>
+        </p:spPr>
+        <p:txBody>
+          <a:bodyPr spcFirstLastPara="1" wrap="square" lIns="91425" tIns="91425" rIns="91425" bIns="91425" anchor="ctr" anchorCtr="0">
+            <a:noAutofit/>
+          </a:bodyPr>
+          <a:lstStyle/>
+          <a:p>
+            <a:pPr marL="0" lvl="0" indent="0" algn="ctr" rtl="0">
+              <a:spcBef>
+                <a:spcPts val="0"/>
+              </a:spcBef>
+              <a:spcAft>
+                <a:spcPts val="0"/>
+              </a:spcAft>
+              <a:buNone/>
+            </a:pPr>
+            <a:r>
+              <a:rPr lang="en-US" sz="6000">
+                <a:solidFill>
+                  <a:srgbClr val="E6E6E6"/>
+                </a:solidFill>
+              </a:rPr>
+              <a:t>6</a:t>
+            </a:r>
+            <a:endParaRPr sz="6000">
+              <a:solidFill>
+                <a:srgbClr val="E6E6E6"/>
+              </a:solidFill>
+            </a:endParaRPr>
+          </a:p>
+          <a:p>
+            <a:r>
+              <a:rPr lang="en-US">
+                <a:effectLst/>
+              </a:rPr>
+              <a:t>Web Scraping</a:t>
+            </a:r>
+            <a:endParaRPr/>
+          </a:p>
+        </p:txBody>
+      </p:sp>
+      <p:sp>
+        <p:nvSpPr>
+          <p:cNvPr id="99" name="Google Shape;99;p15"/>
+          <p:cNvSpPr txBox="1">
+            <a:spLocks noGrp="1"/>
+          </p:cNvSpPr>
+          <p:nvPr>
+            <p:ph type="sldNum" idx="4294967295"/>
+          </p:nvPr>
+        </p:nvSpPr>
+        <p:spPr>
+          <a:xfrm>
+            <a:off x="8404384" y="4749851"/>
+            <a:ext cx="548700" cy="393600"/>
+          </a:xfrm>
+          <a:prstGeom prst="rect">
+            <a:avLst/>
+          </a:prstGeom>
+        </p:spPr>
+        <p:txBody>
+          <a:bodyPr spcFirstLastPara="1" wrap="square" lIns="91425" tIns="91425" rIns="91425" bIns="91425" anchor="t" anchorCtr="0">
+            <a:noAutofit/>
+          </a:bodyPr>
+          <a:lstStyle/>
+          <a:p>
+            <a:pPr marL="0" lvl="0" indent="0" algn="r" rtl="0">
+              <a:spcBef>
+                <a:spcPts val="0"/>
+              </a:spcBef>
+              <a:spcAft>
+                <a:spcPts val="0"/>
+              </a:spcAft>
+              <a:buNone/>
+            </a:pPr>
+            <a:fld id="{00000000-1234-1234-1234-123412341234}" type="slidenum">
+              <a:rPr lang="en"/>
+              <a:t>27</a:t>
+            </a:fld>
+            <a:endParaRPr/>
+          </a:p>
+        </p:txBody>
+      </p:sp>
+    </p:spTree>
+    <p:extLst>
+      <p:ext uri="{BB962C8B-B14F-4D97-AF65-F5344CB8AC3E}">
         <p14:creationId xmlns:p14="http://schemas.microsoft.com/office/powerpoint/2010/main" val="3538335587"/>
       </p:ext>
     </p:extLst>
@@ -9015,7 +10321,7 @@
 </p:sld>
 </file>
 
-<file path=ppt/slides/slide23.xml><?xml version="1.0" encoding="utf-8"?>
+<file path=ppt/slides/slide28.xml><?xml version="1.0" encoding="utf-8"?>
 <p:sld xmlns:a="http://schemas.openxmlformats.org/drawingml/2006/main" xmlns:r="http://schemas.openxmlformats.org/officeDocument/2006/relationships" xmlns:p="http://schemas.openxmlformats.org/presentationml/2006/main">
   <p:cSld>
     <p:spTree>
@@ -9244,7 +10550,7 @@
             </a:pPr>
             <a:fld id="{00000000-1234-1234-1234-123412341234}" type="slidenum">
               <a:rPr lang="en"/>
-              <a:t>23</a:t>
+              <a:t>28</a:t>
             </a:fld>
             <a:endParaRPr/>
           </a:p>
@@ -9258,7 +10564,7 @@
 </p:sld>
 </file>
 
-<file path=ppt/slides/slide24.xml><?xml version="1.0" encoding="utf-8"?>
+<file path=ppt/slides/slide29.xml><?xml version="1.0" encoding="utf-8"?>
 <p:sld xmlns:a="http://schemas.openxmlformats.org/drawingml/2006/main" xmlns:r="http://schemas.openxmlformats.org/officeDocument/2006/relationships" xmlns:p="http://schemas.openxmlformats.org/presentationml/2006/main">
   <p:cSld>
     <p:spTree>
@@ -9395,7 +10701,7 @@
             </a:pPr>
             <a:fld id="{00000000-1234-1234-1234-123412341234}" type="slidenum">
               <a:rPr lang="en"/>
-              <a:t>24</a:t>
+              <a:t>29</a:t>
             </a:fld>
             <a:endParaRPr/>
           </a:p>

</xml_diff>

<commit_message>
add functions and lambdas
</commit_message>
<xml_diff>
--- a/Python.pptx
+++ b/Python.pptx
@@ -5,10 +5,10 @@
     <p:sldMasterId id="2147483658" r:id="rId1"/>
   </p:sldMasterIdLst>
   <p:notesMasterIdLst>
-    <p:notesMasterId r:id="rId35"/>
+    <p:notesMasterId r:id="rId40"/>
   </p:notesMasterIdLst>
   <p:handoutMasterIdLst>
-    <p:handoutMasterId r:id="rId36"/>
+    <p:handoutMasterId r:id="rId41"/>
   </p:handoutMasterIdLst>
   <p:sldIdLst>
     <p:sldId id="256" r:id="rId2"/>
@@ -35,49 +35,54 @@
     <p:sldId id="307" r:id="rId23"/>
     <p:sldId id="309" r:id="rId24"/>
     <p:sldId id="310" r:id="rId25"/>
-    <p:sldId id="259" r:id="rId26"/>
-    <p:sldId id="281" r:id="rId27"/>
-    <p:sldId id="289" r:id="rId28"/>
-    <p:sldId id="282" r:id="rId29"/>
-    <p:sldId id="283" r:id="rId30"/>
-    <p:sldId id="286" r:id="rId31"/>
-    <p:sldId id="287" r:id="rId32"/>
-    <p:sldId id="280" r:id="rId33"/>
-    <p:sldId id="271" r:id="rId34"/>
+    <p:sldId id="313" r:id="rId26"/>
+    <p:sldId id="314" r:id="rId27"/>
+    <p:sldId id="317" r:id="rId28"/>
+    <p:sldId id="315" r:id="rId29"/>
+    <p:sldId id="316" r:id="rId30"/>
+    <p:sldId id="259" r:id="rId31"/>
+    <p:sldId id="281" r:id="rId32"/>
+    <p:sldId id="289" r:id="rId33"/>
+    <p:sldId id="282" r:id="rId34"/>
+    <p:sldId id="283" r:id="rId35"/>
+    <p:sldId id="286" r:id="rId36"/>
+    <p:sldId id="287" r:id="rId37"/>
+    <p:sldId id="280" r:id="rId38"/>
+    <p:sldId id="271" r:id="rId39"/>
   </p:sldIdLst>
   <p:sldSz cx="9144000" cy="5143500" type="screen16x9"/>
   <p:notesSz cx="6858000" cy="9144000"/>
   <p:embeddedFontLst>
     <p:embeddedFont>
       <p:font typeface="Consolas" panose="020B0609020204030204" pitchFamily="49" charset="0"/>
-      <p:regular r:id="rId37"/>
-      <p:bold r:id="rId38"/>
-      <p:italic r:id="rId39"/>
-      <p:boldItalic r:id="rId40"/>
+      <p:regular r:id="rId42"/>
+      <p:bold r:id="rId43"/>
+      <p:italic r:id="rId44"/>
+      <p:boldItalic r:id="rId45"/>
     </p:embeddedFont>
     <p:embeddedFont>
       <p:font typeface="IRANSans" panose="020B0506030804020204" pitchFamily="34" charset="-78"/>
-      <p:regular r:id="rId41"/>
-      <p:bold r:id="rId42"/>
+      <p:regular r:id="rId46"/>
+      <p:bold r:id="rId47"/>
     </p:embeddedFont>
     <p:embeddedFont>
       <p:font typeface="Roboto Slab" panose="020B0604020202020204" charset="0"/>
-      <p:regular r:id="rId43"/>
-      <p:bold r:id="rId44"/>
+      <p:regular r:id="rId48"/>
+      <p:bold r:id="rId49"/>
     </p:embeddedFont>
     <p:embeddedFont>
       <p:font typeface="Source Sans Pro" panose="020B0503030403020204" pitchFamily="34" charset="0"/>
-      <p:regular r:id="rId45"/>
-      <p:bold r:id="rId46"/>
-      <p:italic r:id="rId47"/>
-      <p:boldItalic r:id="rId48"/>
+      <p:regular r:id="rId50"/>
+      <p:bold r:id="rId51"/>
+      <p:italic r:id="rId52"/>
+      <p:boldItalic r:id="rId53"/>
     </p:embeddedFont>
     <p:embeddedFont>
       <p:font typeface="Trebuchet MS" panose="020B0603020202020204" pitchFamily="34" charset="0"/>
-      <p:regular r:id="rId49"/>
-      <p:bold r:id="rId50"/>
-      <p:italic r:id="rId51"/>
-      <p:boldItalic r:id="rId52"/>
+      <p:regular r:id="rId54"/>
+      <p:bold r:id="rId55"/>
+      <p:italic r:id="rId56"/>
+      <p:boldItalic r:id="rId57"/>
     </p:embeddedFont>
   </p:embeddedFontLst>
   <p:defaultTextStyle>
@@ -17016,7 +17021,7 @@
                 <a:latin typeface="Consolas" panose="020B0609020204030204" pitchFamily="49" charset="0"/>
                 <a:cs typeface="Courier New" panose="02070309020205020404" pitchFamily="49" charset="0"/>
               </a:rPr>
-              <a:t>for number in </a:t>
+              <a:t>for number in range(5</a:t>
             </a:r>
             <a:r>
               <a:rPr lang="en-US" sz="1100">
@@ -17026,23 +17031,6 @@
                 <a:latin typeface="Consolas" panose="020B0609020204030204" pitchFamily="49" charset="0"/>
                 <a:cs typeface="Courier New" panose="02070309020205020404" pitchFamily="49" charset="0"/>
               </a:rPr>
-              <a:t>range(</a:t>
-            </a:r>
-            <a:r>
-              <a:rPr lang="en-US" sz="1100">
-                <a:latin typeface="Consolas" panose="020B0609020204030204" pitchFamily="49" charset="0"/>
-                <a:cs typeface="Courier New" panose="02070309020205020404" pitchFamily="49" charset="0"/>
-              </a:rPr>
-              <a:t>5</a:t>
-            </a:r>
-            <a:r>
-              <a:rPr lang="en-US" sz="1100">
-                <a:solidFill>
-                  <a:schemeClr val="accent1"/>
-                </a:solidFill>
-                <a:latin typeface="Consolas" panose="020B0609020204030204" pitchFamily="49" charset="0"/>
-                <a:cs typeface="Courier New" panose="02070309020205020404" pitchFamily="49" charset="0"/>
-              </a:rPr>
               <a:t>,</a:t>
             </a:r>
             <a:r>
@@ -17050,24 +17038,7 @@
                 <a:latin typeface="Consolas" panose="020B0609020204030204" pitchFamily="49" charset="0"/>
                 <a:cs typeface="Courier New" panose="02070309020205020404" pitchFamily="49" charset="0"/>
               </a:rPr>
-              <a:t> 20</a:t>
-            </a:r>
-            <a:r>
-              <a:rPr lang="en-US" sz="1100">
-                <a:solidFill>
-                  <a:schemeClr val="accent1"/>
-                </a:solidFill>
-                <a:latin typeface="Consolas" panose="020B0609020204030204" pitchFamily="49" charset="0"/>
-                <a:cs typeface="Courier New" panose="02070309020205020404" pitchFamily="49" charset="0"/>
-              </a:rPr>
-              <a:t>)</a:t>
-            </a:r>
-            <a:r>
-              <a:rPr lang="en-US" sz="1100">
-                <a:latin typeface="Consolas" panose="020B0609020204030204" pitchFamily="49" charset="0"/>
-                <a:cs typeface="Courier New" panose="02070309020205020404" pitchFamily="49" charset="0"/>
-              </a:rPr>
-              <a:t>:</a:t>
+              <a:t> 20):</a:t>
             </a:r>
           </a:p>
           <a:p>
@@ -17100,7 +17071,7 @@
                 <a:latin typeface="Consolas" panose="020B0609020204030204" pitchFamily="49" charset="0"/>
                 <a:cs typeface="Courier New" panose="02070309020205020404" pitchFamily="49" charset="0"/>
               </a:rPr>
-              <a:t>for number in </a:t>
+              <a:t>for number in range(5</a:t>
             </a:r>
             <a:r>
               <a:rPr lang="en-US" sz="1100">
@@ -17110,14 +17081,14 @@
                 <a:latin typeface="Consolas" panose="020B0609020204030204" pitchFamily="49" charset="0"/>
                 <a:cs typeface="Courier New" panose="02070309020205020404" pitchFamily="49" charset="0"/>
               </a:rPr>
-              <a:t>range(</a:t>
-            </a:r>
-            <a:r>
-              <a:rPr lang="en-US" sz="1100">
-                <a:latin typeface="Consolas" panose="020B0609020204030204" pitchFamily="49" charset="0"/>
-                <a:cs typeface="Courier New" panose="02070309020205020404" pitchFamily="49" charset="0"/>
-              </a:rPr>
-              <a:t>5</a:t>
+              <a:t>,</a:t>
+            </a:r>
+            <a:r>
+              <a:rPr lang="en-US" sz="1100">
+                <a:latin typeface="Consolas" panose="020B0609020204030204" pitchFamily="49" charset="0"/>
+                <a:cs typeface="Courier New" panose="02070309020205020404" pitchFamily="49" charset="0"/>
+              </a:rPr>
+              <a:t> 20</a:t>
             </a:r>
             <a:r>
               <a:rPr lang="en-US" sz="1100">
@@ -17134,41 +17105,7 @@
                 <a:latin typeface="Consolas" panose="020B0609020204030204" pitchFamily="49" charset="0"/>
                 <a:cs typeface="Courier New" panose="02070309020205020404" pitchFamily="49" charset="0"/>
               </a:rPr>
-              <a:t> 20</a:t>
-            </a:r>
-            <a:r>
-              <a:rPr lang="en-US" sz="1100">
-                <a:solidFill>
-                  <a:schemeClr val="accent1"/>
-                </a:solidFill>
-                <a:latin typeface="Consolas" panose="020B0609020204030204" pitchFamily="49" charset="0"/>
-                <a:cs typeface="Courier New" panose="02070309020205020404" pitchFamily="49" charset="0"/>
-              </a:rPr>
-              <a:t>,</a:t>
-            </a:r>
-            <a:r>
-              <a:rPr lang="en-US" sz="1100">
-                <a:latin typeface="Consolas" panose="020B0609020204030204" pitchFamily="49" charset="0"/>
-                <a:cs typeface="Courier New" panose="02070309020205020404" pitchFamily="49" charset="0"/>
-              </a:rPr>
-              <a:t> 2</a:t>
-            </a:r>
-            <a:r>
-              <a:rPr lang="en-US" sz="1100">
-                <a:solidFill>
-                  <a:schemeClr val="accent1"/>
-                </a:solidFill>
-                <a:latin typeface="Consolas" panose="020B0609020204030204" pitchFamily="49" charset="0"/>
-                <a:cs typeface="Courier New" panose="02070309020205020404" pitchFamily="49" charset="0"/>
-              </a:rPr>
-              <a:t>)</a:t>
-            </a:r>
-            <a:r>
-              <a:rPr lang="en-US" sz="1100">
-                <a:latin typeface="Consolas" panose="020B0609020204030204" pitchFamily="49" charset="0"/>
-                <a:cs typeface="Courier New" panose="02070309020205020404" pitchFamily="49" charset="0"/>
-              </a:rPr>
-              <a:t>:</a:t>
+              <a:t> 2):</a:t>
             </a:r>
           </a:p>
           <a:p>
@@ -17726,7 +17663,7 @@
   <p:cSld>
     <p:spTree>
       <p:nvGrpSpPr>
-        <p:cNvPr id="1" name="Shape 96"/>
+        <p:cNvPr id="1" name=""/>
         <p:cNvGrpSpPr/>
         <p:nvPr/>
       </p:nvGrpSpPr>
@@ -17740,93 +17677,252 @@
       </p:grpSpPr>
       <p:sp>
         <p:nvSpPr>
-          <p:cNvPr id="97" name="Google Shape;97;p15"/>
-          <p:cNvSpPr txBox="1">
+          <p:cNvPr id="2" name="Title 1">
+            <a:extLst>
+              <a:ext uri="{FF2B5EF4-FFF2-40B4-BE49-F238E27FC236}">
+                <a16:creationId xmlns:a16="http://schemas.microsoft.com/office/drawing/2014/main" id="{024AD384-5AD1-4435-A943-1241B2FACD62}"/>
+              </a:ext>
+            </a:extLst>
+          </p:cNvPr>
+          <p:cNvSpPr>
             <a:spLocks noGrp="1"/>
           </p:cNvSpPr>
           <p:nvPr>
-            <p:ph type="ctrTitle"/>
+            <p:ph type="title"/>
+          </p:nvPr>
+        </p:nvSpPr>
+        <p:spPr/>
+        <p:txBody>
+          <a:bodyPr/>
+          <a:lstStyle/>
+          <a:p>
+            <a:r>
+              <a:rPr lang="en-US"/>
+              <a:t>Python Functions</a:t>
+            </a:r>
+            <a:endParaRPr lang="fa-IR"/>
+          </a:p>
+        </p:txBody>
+      </p:sp>
+      <p:sp>
+        <p:nvSpPr>
+          <p:cNvPr id="3" name="Text Placeholder 2">
+            <a:extLst>
+              <a:ext uri="{FF2B5EF4-FFF2-40B4-BE49-F238E27FC236}">
+                <a16:creationId xmlns:a16="http://schemas.microsoft.com/office/drawing/2014/main" id="{58BE3078-8B89-4550-B497-93E4DADBD57E}"/>
+              </a:ext>
+            </a:extLst>
+          </p:cNvPr>
+          <p:cNvSpPr>
+            <a:spLocks noGrp="1"/>
+          </p:cNvSpPr>
+          <p:nvPr>
+            <p:ph type="body" idx="1"/>
           </p:nvPr>
         </p:nvSpPr>
         <p:spPr>
           <a:xfrm>
-            <a:off x="1655700" y="1991850"/>
-            <a:ext cx="5832600" cy="1159800"/>
+            <a:off x="786150" y="1142608"/>
+            <a:ext cx="7571700" cy="3626431"/>
           </a:xfrm>
-          <a:prstGeom prst="rect">
-            <a:avLst/>
-          </a:prstGeom>
         </p:spPr>
         <p:txBody>
-          <a:bodyPr spcFirstLastPara="1" wrap="square" lIns="91425" tIns="91425" rIns="91425" bIns="91425" anchor="ctr" anchorCtr="0">
-            <a:noAutofit/>
-          </a:bodyPr>
+          <a:bodyPr/>
           <a:lstStyle/>
           <a:p>
-            <a:pPr marL="0" lvl="0" indent="0" algn="ctr" rtl="0">
-              <a:spcBef>
-                <a:spcPts val="0"/>
-              </a:spcBef>
-              <a:spcAft>
-                <a:spcPts val="0"/>
-              </a:spcAft>
-              <a:buNone/>
-            </a:pPr>
-            <a:r>
-              <a:rPr lang="en-US" sz="6000">
+            <a:pPr marL="76200" indent="0">
+              <a:buNone/>
+            </a:pPr>
+            <a:r>
+              <a:rPr lang="en-US" sz="1400"/>
+              <a:t>Blocks of code which only run when they are called</a:t>
+            </a:r>
+          </a:p>
+          <a:p>
+            <a:pPr marL="76200" indent="0">
+              <a:buNone/>
+            </a:pPr>
+            <a:r>
+              <a:rPr lang="en-US" sz="1100">
                 <a:solidFill>
-                  <a:srgbClr val="E6E6E6"/>
+                  <a:schemeClr val="accent1"/>
                 </a:solidFill>
-              </a:rPr>
-              <a:t>0</a:t>
-            </a:r>
-            <a:endParaRPr sz="6000">
-              <a:solidFill>
-                <a:srgbClr val="E6E6E6"/>
-              </a:solidFill>
+                <a:latin typeface="Consolas" panose="020B0609020204030204" pitchFamily="49" charset="0"/>
+                <a:cs typeface="Courier New" panose="02070309020205020404" pitchFamily="49" charset="0"/>
+              </a:rPr>
+              <a:t>def</a:t>
+            </a:r>
+            <a:r>
+              <a:rPr lang="en-US" sz="1100">
+                <a:latin typeface="Consolas" panose="020B0609020204030204" pitchFamily="49" charset="0"/>
+                <a:cs typeface="Courier New" panose="02070309020205020404" pitchFamily="49" charset="0"/>
+              </a:rPr>
+              <a:t> greeter</a:t>
+            </a:r>
+            <a:r>
+              <a:rPr lang="en-US" sz="1100">
+                <a:solidFill>
+                  <a:schemeClr val="accent1"/>
+                </a:solidFill>
+                <a:latin typeface="Consolas" panose="020B0609020204030204" pitchFamily="49" charset="0"/>
+                <a:cs typeface="Courier New" panose="02070309020205020404" pitchFamily="49" charset="0"/>
+              </a:rPr>
+              <a:t>():</a:t>
+            </a:r>
+          </a:p>
+          <a:p>
+            <a:pPr marL="76200" indent="0">
+              <a:buNone/>
+            </a:pPr>
+            <a:r>
+              <a:rPr lang="en-US" sz="1100">
+                <a:latin typeface="Consolas" panose="020B0609020204030204" pitchFamily="49" charset="0"/>
+                <a:cs typeface="Courier New" panose="02070309020205020404" pitchFamily="49" charset="0"/>
+              </a:rPr>
+              <a:t>    print('Hello!')</a:t>
+            </a:r>
+          </a:p>
+          <a:p>
+            <a:pPr marL="76200" indent="0">
+              <a:buNone/>
+            </a:pPr>
+            <a:r>
+              <a:rPr lang="en-US" sz="1100">
+                <a:latin typeface="Consolas" panose="020B0609020204030204" pitchFamily="49" charset="0"/>
+                <a:cs typeface="Courier New" panose="02070309020205020404" pitchFamily="49" charset="0"/>
+              </a:rPr>
+              <a:t>greeter</a:t>
+            </a:r>
+            <a:r>
+              <a:rPr lang="en-US" sz="1100">
+                <a:solidFill>
+                  <a:schemeClr val="accent1"/>
+                </a:solidFill>
+                <a:latin typeface="Consolas" panose="020B0609020204030204" pitchFamily="49" charset="0"/>
+                <a:cs typeface="Courier New" panose="02070309020205020404" pitchFamily="49" charset="0"/>
+              </a:rPr>
+              <a:t>()</a:t>
+            </a:r>
+          </a:p>
+          <a:p>
+            <a:pPr marL="76200" indent="0">
+              <a:buNone/>
+            </a:pPr>
+            <a:endParaRPr lang="en-US" sz="1100">
+              <a:latin typeface="Consolas" panose="020B0609020204030204" pitchFamily="49" charset="0"/>
+              <a:cs typeface="Courier New" panose="02070309020205020404" pitchFamily="49" charset="0"/>
             </a:endParaRPr>
           </a:p>
           <a:p>
-            <a:pPr marL="0" lvl="0" indent="0" algn="ctr" rtl="0">
-              <a:spcBef>
-                <a:spcPts val="0"/>
-              </a:spcBef>
-              <a:spcAft>
-                <a:spcPts val="0"/>
-              </a:spcAft>
-              <a:buNone/>
-            </a:pPr>
-            <a:r>
-              <a:rPr lang="en"/>
-              <a:t>Basics</a:t>
-            </a:r>
-            <a:endParaRPr/>
+            <a:pPr marL="76200" indent="0">
+              <a:buNone/>
+            </a:pPr>
+            <a:r>
+              <a:rPr lang="en-US" sz="1400"/>
+              <a:t>Arguments and return</a:t>
+            </a:r>
+            <a:endParaRPr lang="en-US" sz="1400">
+              <a:cs typeface="Courier New" panose="02070309020205020404" pitchFamily="49" charset="0"/>
+            </a:endParaRPr>
+          </a:p>
+          <a:p>
+            <a:pPr marL="76200" indent="0">
+              <a:buNone/>
+            </a:pPr>
+            <a:r>
+              <a:rPr lang="en-US" sz="1100">
+                <a:latin typeface="Consolas" panose="020B0609020204030204" pitchFamily="49" charset="0"/>
+                <a:cs typeface="Courier New" panose="02070309020205020404" pitchFamily="49" charset="0"/>
+              </a:rPr>
+              <a:t>def greeter(firstName, lastName):</a:t>
+            </a:r>
+          </a:p>
+          <a:p>
+            <a:pPr marL="76200" indent="0">
+              <a:buNone/>
+            </a:pPr>
+            <a:r>
+              <a:rPr lang="en-US" sz="1100">
+                <a:latin typeface="Consolas" panose="020B0609020204030204" pitchFamily="49" charset="0"/>
+                <a:cs typeface="Courier New" panose="02070309020205020404" pitchFamily="49" charset="0"/>
+              </a:rPr>
+              <a:t>    greeting = f'Hello {name}!'</a:t>
+            </a:r>
+          </a:p>
+          <a:p>
+            <a:pPr marL="76200" indent="0">
+              <a:buNone/>
+            </a:pPr>
+            <a:r>
+              <a:rPr lang="en-US" sz="1100">
+                <a:latin typeface="Consolas" panose="020B0609020204030204" pitchFamily="49" charset="0"/>
+                <a:cs typeface="Courier New" panose="02070309020205020404" pitchFamily="49" charset="0"/>
+              </a:rPr>
+              <a:t>    </a:t>
+            </a:r>
+            <a:r>
+              <a:rPr lang="en-US" sz="1100">
+                <a:solidFill>
+                  <a:schemeClr val="accent1"/>
+                </a:solidFill>
+                <a:latin typeface="Consolas" panose="020B0609020204030204" pitchFamily="49" charset="0"/>
+                <a:cs typeface="Courier New" panose="02070309020205020404" pitchFamily="49" charset="0"/>
+              </a:rPr>
+              <a:t>return </a:t>
+            </a:r>
+            <a:r>
+              <a:rPr lang="en-US" sz="1100">
+                <a:latin typeface="Consolas" panose="020B0609020204030204" pitchFamily="49" charset="0"/>
+                <a:cs typeface="Courier New" panose="02070309020205020404" pitchFamily="49" charset="0"/>
+              </a:rPr>
+              <a:t>greeting</a:t>
+            </a:r>
+          </a:p>
+          <a:p>
+            <a:pPr marL="76200" indent="0">
+              <a:buNone/>
+            </a:pPr>
+            <a:r>
+              <a:rPr lang="en-US" sz="1100">
+                <a:latin typeface="Consolas" panose="020B0609020204030204" pitchFamily="49" charset="0"/>
+                <a:cs typeface="Courier New" panose="02070309020205020404" pitchFamily="49" charset="0"/>
+              </a:rPr>
+              <a:t>message = greeter('Alireza', 'Nezhadshamsi')</a:t>
+            </a:r>
+          </a:p>
+          <a:p>
+            <a:pPr marL="76200" indent="0">
+              <a:buNone/>
+            </a:pPr>
+            <a:r>
+              <a:rPr lang="en-US" sz="1100">
+                <a:latin typeface="Consolas" panose="020B0609020204030204" pitchFamily="49" charset="0"/>
+                <a:cs typeface="Courier New" panose="02070309020205020404" pitchFamily="49" charset="0"/>
+              </a:rPr>
+              <a:t>print(message)</a:t>
+            </a:r>
           </a:p>
         </p:txBody>
       </p:sp>
       <p:sp>
         <p:nvSpPr>
-          <p:cNvPr id="99" name="Google Shape;99;p15"/>
-          <p:cNvSpPr txBox="1">
+          <p:cNvPr id="4" name="Slide Number Placeholder 3">
+            <a:extLst>
+              <a:ext uri="{FF2B5EF4-FFF2-40B4-BE49-F238E27FC236}">
+                <a16:creationId xmlns:a16="http://schemas.microsoft.com/office/drawing/2014/main" id="{64987AE6-EC0E-43DD-9376-95A5602EE5E1}"/>
+              </a:ext>
+            </a:extLst>
+          </p:cNvPr>
+          <p:cNvSpPr>
             <a:spLocks noGrp="1"/>
           </p:cNvSpPr>
           <p:nvPr>
-            <p:ph type="sldNum" idx="4294967295"/>
+            <p:ph type="sldNum" idx="12"/>
           </p:nvPr>
         </p:nvSpPr>
-        <p:spPr>
-          <a:xfrm>
-            <a:off x="8404384" y="4749851"/>
-            <a:ext cx="548700" cy="393600"/>
-          </a:xfrm>
-          <a:prstGeom prst="rect">
-            <a:avLst/>
-          </a:prstGeom>
-        </p:spPr>
+        <p:spPr/>
         <p:txBody>
-          <a:bodyPr spcFirstLastPara="1" wrap="square" lIns="91425" tIns="91425" rIns="91425" bIns="91425" anchor="t" anchorCtr="0">
-            <a:noAutofit/>
-          </a:bodyPr>
+          <a:bodyPr/>
           <a:lstStyle/>
           <a:p>
             <a:pPr marL="0" lvl="0" indent="0" algn="r" rtl="0">
@@ -17839,150 +17935,17 @@
               <a:buNone/>
             </a:pPr>
             <a:fld id="{00000000-1234-1234-1234-123412341234}" type="slidenum">
-              <a:rPr lang="en"/>
+              <a:rPr lang="en" smtClean="0"/>
               <a:t>25</a:t>
             </a:fld>
-            <a:endParaRPr/>
-          </a:p>
-        </p:txBody>
-      </p:sp>
-    </p:spTree>
-  </p:cSld>
-  <p:clrMapOvr>
-    <a:masterClrMapping/>
-  </p:clrMapOvr>
-</p:sld>
-</file>
-
-<file path=ppt/slides/slide26.xml><?xml version="1.0" encoding="utf-8"?>
-<p:sld xmlns:a="http://schemas.openxmlformats.org/drawingml/2006/main" xmlns:r="http://schemas.openxmlformats.org/officeDocument/2006/relationships" xmlns:p="http://schemas.openxmlformats.org/presentationml/2006/main">
-  <p:cSld>
-    <p:spTree>
-      <p:nvGrpSpPr>
-        <p:cNvPr id="1" name="Shape 96"/>
-        <p:cNvGrpSpPr/>
-        <p:nvPr/>
-      </p:nvGrpSpPr>
-      <p:grpSpPr>
-        <a:xfrm>
-          <a:off x="0" y="0"/>
-          <a:ext cx="0" cy="0"/>
-          <a:chOff x="0" y="0"/>
-          <a:chExt cx="0" cy="0"/>
-        </a:xfrm>
-      </p:grpSpPr>
-      <p:sp>
-        <p:nvSpPr>
-          <p:cNvPr id="97" name="Google Shape;97;p15"/>
-          <p:cNvSpPr txBox="1">
-            <a:spLocks noGrp="1"/>
-          </p:cNvSpPr>
-          <p:nvPr>
-            <p:ph type="ctrTitle"/>
-          </p:nvPr>
-        </p:nvSpPr>
-        <p:spPr>
-          <a:xfrm>
-            <a:off x="1655700" y="1991850"/>
-            <a:ext cx="5832600" cy="1159800"/>
-          </a:xfrm>
-          <a:prstGeom prst="rect">
-            <a:avLst/>
-          </a:prstGeom>
-        </p:spPr>
-        <p:txBody>
-          <a:bodyPr spcFirstLastPara="1" wrap="square" lIns="91425" tIns="91425" rIns="91425" bIns="91425" anchor="ctr" anchorCtr="0">
-            <a:noAutofit/>
-          </a:bodyPr>
-          <a:lstStyle/>
-          <a:p>
-            <a:pPr marL="0" lvl="0" indent="0" algn="ctr" rtl="0">
-              <a:spcBef>
-                <a:spcPts val="0"/>
-              </a:spcBef>
-              <a:spcAft>
-                <a:spcPts val="0"/>
-              </a:spcAft>
-              <a:buNone/>
-            </a:pPr>
-            <a:r>
-              <a:rPr lang="en-US" sz="6000">
-                <a:solidFill>
-                  <a:srgbClr val="E6E6E6"/>
-                </a:solidFill>
-              </a:rPr>
-              <a:t>2</a:t>
-            </a:r>
-            <a:endParaRPr sz="6000">
-              <a:solidFill>
-                <a:srgbClr val="E6E6E6"/>
-              </a:solidFill>
-            </a:endParaRPr>
-          </a:p>
-          <a:p>
-            <a:pPr marL="0" lvl="0" indent="0" algn="ctr" rtl="0">
-              <a:spcBef>
-                <a:spcPts val="0"/>
-              </a:spcBef>
-              <a:spcAft>
-                <a:spcPts val="0"/>
-              </a:spcAft>
-              <a:buNone/>
-            </a:pPr>
-            <a:r>
-              <a:rPr lang="en"/>
-              <a:t>NumPy</a:t>
-            </a:r>
-            <a:endParaRPr/>
-          </a:p>
-        </p:txBody>
-      </p:sp>
-      <p:sp>
-        <p:nvSpPr>
-          <p:cNvPr id="99" name="Google Shape;99;p15"/>
-          <p:cNvSpPr txBox="1">
-            <a:spLocks noGrp="1"/>
-          </p:cNvSpPr>
-          <p:nvPr>
-            <p:ph type="sldNum" idx="4294967295"/>
-          </p:nvPr>
-        </p:nvSpPr>
-        <p:spPr>
-          <a:xfrm>
-            <a:off x="8404384" y="4749851"/>
-            <a:ext cx="548700" cy="393600"/>
-          </a:xfrm>
-          <a:prstGeom prst="rect">
-            <a:avLst/>
-          </a:prstGeom>
-        </p:spPr>
-        <p:txBody>
-          <a:bodyPr spcFirstLastPara="1" wrap="square" lIns="91425" tIns="91425" rIns="91425" bIns="91425" anchor="t" anchorCtr="0">
-            <a:noAutofit/>
-          </a:bodyPr>
-          <a:lstStyle/>
-          <a:p>
-            <a:pPr marL="0" lvl="0" indent="0" algn="r" rtl="0">
-              <a:spcBef>
-                <a:spcPts val="0"/>
-              </a:spcBef>
-              <a:spcAft>
-                <a:spcPts val="0"/>
-              </a:spcAft>
-              <a:buNone/>
-            </a:pPr>
-            <a:fld id="{00000000-1234-1234-1234-123412341234}" type="slidenum">
-              <a:rPr lang="en"/>
-              <a:t>26</a:t>
-            </a:fld>
-            <a:endParaRPr/>
+            <a:endParaRPr lang="en"/>
           </a:p>
         </p:txBody>
       </p:sp>
     </p:spTree>
     <p:extLst>
       <p:ext uri="{BB962C8B-B14F-4D97-AF65-F5344CB8AC3E}">
-        <p14:creationId xmlns:p14="http://schemas.microsoft.com/office/powerpoint/2010/main" val="1620004517"/>
+        <p14:creationId xmlns:p14="http://schemas.microsoft.com/office/powerpoint/2010/main" val="1672306859"/>
       </p:ext>
     </p:extLst>
   </p:cSld>
@@ -17992,7 +17955,7 @@
 </p:sld>
 </file>
 
-<file path=ppt/slides/slide27.xml><?xml version="1.0" encoding="utf-8"?>
+<file path=ppt/slides/slide26.xml><?xml version="1.0" encoding="utf-8"?>
 <p:sld xmlns:a="http://schemas.openxmlformats.org/drawingml/2006/main" xmlns:r="http://schemas.openxmlformats.org/officeDocument/2006/relationships" xmlns:p="http://schemas.openxmlformats.org/presentationml/2006/main">
   <p:cSld>
     <p:spTree>
@@ -18031,12 +17994,8 @@
           <a:lstStyle/>
           <a:p>
             <a:r>
-              <a:rPr lang="en-US" err="1"/>
-              <a:t>Numpy</a:t>
-            </a:r>
-            <a:r>
               <a:rPr lang="en-US"/>
-              <a:t> Introduction</a:t>
+              <a:t>Python Function Arguments</a:t>
             </a:r>
             <a:endParaRPr lang="fa-IR"/>
           </a:p>
@@ -18073,14 +18032,117 @@
             </a:pPr>
             <a:r>
               <a:rPr lang="en-US" sz="1400"/>
-              <a:t>NumPy is a Python library used for working with arrays.</a:t>
-            </a:r>
-          </a:p>
-          <a:p>
-            <a:pPr marL="76200" indent="0">
-              <a:buNone/>
-            </a:pPr>
-            <a:endParaRPr lang="en-US" sz="1400"/>
+              <a:t>Keyword arguments</a:t>
+            </a:r>
+            <a:endParaRPr lang="en-US" sz="1400">
+              <a:cs typeface="Courier New" panose="02070309020205020404" pitchFamily="49" charset="0"/>
+            </a:endParaRPr>
+          </a:p>
+          <a:p>
+            <a:pPr marL="76200" indent="0">
+              <a:buNone/>
+            </a:pPr>
+            <a:r>
+              <a:rPr lang="en-US" sz="1100">
+                <a:latin typeface="Consolas" panose="020B0609020204030204" pitchFamily="49" charset="0"/>
+                <a:cs typeface="Courier New" panose="02070309020205020404" pitchFamily="49" charset="0"/>
+              </a:rPr>
+              <a:t>def greeter(firstName</a:t>
+            </a:r>
+            <a:r>
+              <a:rPr lang="en-US" sz="1100">
+                <a:solidFill>
+                  <a:schemeClr val="accent1"/>
+                </a:solidFill>
+                <a:latin typeface="Consolas" panose="020B0609020204030204" pitchFamily="49" charset="0"/>
+                <a:cs typeface="Courier New" panose="02070309020205020404" pitchFamily="49" charset="0"/>
+              </a:rPr>
+              <a:t>,</a:t>
+            </a:r>
+            <a:r>
+              <a:rPr lang="en-US" sz="1100">
+                <a:latin typeface="Consolas" panose="020B0609020204030204" pitchFamily="49" charset="0"/>
+                <a:cs typeface="Courier New" panose="02070309020205020404" pitchFamily="49" charset="0"/>
+              </a:rPr>
+              <a:t> lastName):</a:t>
+            </a:r>
+          </a:p>
+          <a:p>
+            <a:pPr marL="76200" indent="0">
+              <a:buNone/>
+            </a:pPr>
+            <a:r>
+              <a:rPr lang="en-US" sz="1100">
+                <a:solidFill>
+                  <a:schemeClr val="accent1"/>
+                </a:solidFill>
+                <a:latin typeface="Consolas" panose="020B0609020204030204" pitchFamily="49" charset="0"/>
+                <a:cs typeface="Courier New" panose="02070309020205020404" pitchFamily="49" charset="0"/>
+              </a:rPr>
+              <a:t>    </a:t>
+            </a:r>
+            <a:r>
+              <a:rPr lang="en-US" sz="1100">
+                <a:latin typeface="Consolas" panose="020B0609020204030204" pitchFamily="49" charset="0"/>
+                <a:cs typeface="Courier New" panose="02070309020205020404" pitchFamily="49" charset="0"/>
+              </a:rPr>
+              <a:t>return f'Hello {firstName} {lastName}!'</a:t>
+            </a:r>
+          </a:p>
+          <a:p>
+            <a:pPr marL="76200" indent="0">
+              <a:buNone/>
+            </a:pPr>
+            <a:r>
+              <a:rPr lang="en-US" sz="1100">
+                <a:latin typeface="Consolas" panose="020B0609020204030204" pitchFamily="49" charset="0"/>
+                <a:cs typeface="Courier New" panose="02070309020205020404" pitchFamily="49" charset="0"/>
+              </a:rPr>
+              <a:t>print(greeter(lastName </a:t>
+            </a:r>
+            <a:r>
+              <a:rPr lang="en-US" sz="1100">
+                <a:solidFill>
+                  <a:schemeClr val="accent1"/>
+                </a:solidFill>
+                <a:latin typeface="Consolas" panose="020B0609020204030204" pitchFamily="49" charset="0"/>
+                <a:cs typeface="Courier New" panose="02070309020205020404" pitchFamily="49" charset="0"/>
+              </a:rPr>
+              <a:t>=</a:t>
+            </a:r>
+            <a:r>
+              <a:rPr lang="en-US" sz="1100">
+                <a:latin typeface="Consolas" panose="020B0609020204030204" pitchFamily="49" charset="0"/>
+                <a:cs typeface="Courier New" panose="02070309020205020404" pitchFamily="49" charset="0"/>
+              </a:rPr>
+              <a:t> 'Nezhadshamsi', firstName </a:t>
+            </a:r>
+            <a:r>
+              <a:rPr lang="en-US" sz="1100">
+                <a:solidFill>
+                  <a:schemeClr val="accent1"/>
+                </a:solidFill>
+                <a:latin typeface="Consolas" panose="020B0609020204030204" pitchFamily="49" charset="0"/>
+                <a:cs typeface="Courier New" panose="02070309020205020404" pitchFamily="49" charset="0"/>
+              </a:rPr>
+              <a:t>=</a:t>
+            </a:r>
+            <a:r>
+              <a:rPr lang="en-US" sz="1100">
+                <a:latin typeface="Consolas" panose="020B0609020204030204" pitchFamily="49" charset="0"/>
+                <a:cs typeface="Courier New" panose="02070309020205020404" pitchFamily="49" charset="0"/>
+              </a:rPr>
+              <a:t> 'Alireza'))</a:t>
+            </a:r>
+          </a:p>
+          <a:p>
+            <a:pPr marL="76200" indent="0">
+              <a:buNone/>
+            </a:pPr>
+            <a:endParaRPr lang="en-US" sz="1100">
+              <a:latin typeface="Consolas" panose="020B0609020204030204" pitchFamily="49" charset="0"/>
+              <a:cs typeface="Courier New" panose="02070309020205020404" pitchFamily="49" charset="0"/>
+            </a:endParaRPr>
           </a:p>
           <a:p>
             <a:pPr marL="76200" indent="0">
@@ -18088,7 +18150,87 @@
             </a:pPr>
             <a:r>
               <a:rPr lang="en-US" sz="1400"/>
-              <a:t>NumPy is short for Numerical Python.</a:t>
+              <a:t>Default parameter value</a:t>
+            </a:r>
+          </a:p>
+          <a:p>
+            <a:pPr marL="76200" indent="0">
+              <a:buNone/>
+            </a:pPr>
+            <a:r>
+              <a:rPr lang="en-US" sz="1100">
+                <a:latin typeface="Consolas" panose="020B0609020204030204" pitchFamily="49" charset="0"/>
+                <a:cs typeface="Courier New" panose="02070309020205020404" pitchFamily="49" charset="0"/>
+              </a:rPr>
+              <a:t>def greeter(firstName </a:t>
+            </a:r>
+            <a:r>
+              <a:rPr lang="en-US" sz="1100">
+                <a:solidFill>
+                  <a:schemeClr val="accent1"/>
+                </a:solidFill>
+                <a:latin typeface="Consolas" panose="020B0609020204030204" pitchFamily="49" charset="0"/>
+                <a:cs typeface="Courier New" panose="02070309020205020404" pitchFamily="49" charset="0"/>
+              </a:rPr>
+              <a:t>=</a:t>
+            </a:r>
+            <a:r>
+              <a:rPr lang="en-US" sz="1100">
+                <a:latin typeface="Consolas" panose="020B0609020204030204" pitchFamily="49" charset="0"/>
+                <a:cs typeface="Courier New" panose="02070309020205020404" pitchFamily="49" charset="0"/>
+              </a:rPr>
+              <a:t> 'Dear', lastName </a:t>
+            </a:r>
+            <a:r>
+              <a:rPr lang="en-US" sz="1100">
+                <a:solidFill>
+                  <a:schemeClr val="accent1"/>
+                </a:solidFill>
+                <a:latin typeface="Consolas" panose="020B0609020204030204" pitchFamily="49" charset="0"/>
+                <a:cs typeface="Courier New" panose="02070309020205020404" pitchFamily="49" charset="0"/>
+              </a:rPr>
+              <a:t>=</a:t>
+            </a:r>
+            <a:r>
+              <a:rPr lang="en-US" sz="1100">
+                <a:latin typeface="Consolas" panose="020B0609020204030204" pitchFamily="49" charset="0"/>
+                <a:cs typeface="Courier New" panose="02070309020205020404" pitchFamily="49" charset="0"/>
+              </a:rPr>
+              <a:t> 'user'):</a:t>
+            </a:r>
+          </a:p>
+          <a:p>
+            <a:pPr marL="76200" indent="0">
+              <a:buNone/>
+            </a:pPr>
+            <a:r>
+              <a:rPr lang="en-US" sz="1100">
+                <a:solidFill>
+                  <a:schemeClr val="accent1"/>
+                </a:solidFill>
+                <a:latin typeface="Consolas" panose="020B0609020204030204" pitchFamily="49" charset="0"/>
+                <a:cs typeface="Courier New" panose="02070309020205020404" pitchFamily="49" charset="0"/>
+              </a:rPr>
+              <a:t>    </a:t>
+            </a:r>
+            <a:r>
+              <a:rPr lang="en-US" sz="1100">
+                <a:latin typeface="Consolas" panose="020B0609020204030204" pitchFamily="49" charset="0"/>
+                <a:cs typeface="Courier New" panose="02070309020205020404" pitchFamily="49" charset="0"/>
+              </a:rPr>
+              <a:t>return f'Hello {firstName} {lastName}!'</a:t>
+            </a:r>
+          </a:p>
+          <a:p>
+            <a:pPr marL="76200" indent="0">
+              <a:buNone/>
+            </a:pPr>
+            <a:r>
+              <a:rPr lang="en-US" sz="1100">
+                <a:latin typeface="Consolas" panose="020B0609020204030204" pitchFamily="49" charset="0"/>
+                <a:cs typeface="Courier New" panose="02070309020205020404" pitchFamily="49" charset="0"/>
+              </a:rPr>
+              <a:t>print(greeter('Alireza', 'Nezhadshamsi'))</a:t>
             </a:r>
           </a:p>
         </p:txBody>
@@ -18125,7 +18267,7 @@
             </a:pPr>
             <a:fld id="{00000000-1234-1234-1234-123412341234}" type="slidenum">
               <a:rPr lang="en" smtClean="0"/>
-              <a:t>27</a:t>
+              <a:t>26</a:t>
             </a:fld>
             <a:endParaRPr lang="en"/>
           </a:p>
@@ -18134,7 +18276,176 @@
     </p:spTree>
     <p:extLst>
       <p:ext uri="{BB962C8B-B14F-4D97-AF65-F5344CB8AC3E}">
-        <p14:creationId xmlns:p14="http://schemas.microsoft.com/office/powerpoint/2010/main" val="4156460407"/>
+        <p14:creationId xmlns:p14="http://schemas.microsoft.com/office/powerpoint/2010/main" val="2571995706"/>
+      </p:ext>
+    </p:extLst>
+  </p:cSld>
+  <p:clrMapOvr>
+    <a:masterClrMapping/>
+  </p:clrMapOvr>
+</p:sld>
+</file>
+
+<file path=ppt/slides/slide27.xml><?xml version="1.0" encoding="utf-8"?>
+<p:sld xmlns:a="http://schemas.openxmlformats.org/drawingml/2006/main" xmlns:r="http://schemas.openxmlformats.org/officeDocument/2006/relationships" xmlns:p="http://schemas.openxmlformats.org/presentationml/2006/main" show="0">
+  <p:cSld>
+    <p:spTree>
+      <p:nvGrpSpPr>
+        <p:cNvPr id="1" name=""/>
+        <p:cNvGrpSpPr/>
+        <p:nvPr/>
+      </p:nvGrpSpPr>
+      <p:grpSpPr>
+        <a:xfrm>
+          <a:off x="0" y="0"/>
+          <a:ext cx="0" cy="0"/>
+          <a:chOff x="0" y="0"/>
+          <a:chExt cx="0" cy="0"/>
+        </a:xfrm>
+      </p:grpSpPr>
+      <p:sp>
+        <p:nvSpPr>
+          <p:cNvPr id="2" name="Title 1">
+            <a:extLst>
+              <a:ext uri="{FF2B5EF4-FFF2-40B4-BE49-F238E27FC236}">
+                <a16:creationId xmlns:a16="http://schemas.microsoft.com/office/drawing/2014/main" id="{024AD384-5AD1-4435-A943-1241B2FACD62}"/>
+              </a:ext>
+            </a:extLst>
+          </p:cNvPr>
+          <p:cNvSpPr>
+            <a:spLocks noGrp="1"/>
+          </p:cNvSpPr>
+          <p:nvPr>
+            <p:ph type="title"/>
+          </p:nvPr>
+        </p:nvSpPr>
+        <p:spPr/>
+        <p:txBody>
+          <a:bodyPr/>
+          <a:lstStyle/>
+          <a:p>
+            <a:r>
+              <a:rPr lang="en-US"/>
+              <a:t>Python Functions</a:t>
+            </a:r>
+            <a:endParaRPr lang="fa-IR"/>
+          </a:p>
+        </p:txBody>
+      </p:sp>
+      <p:sp>
+        <p:nvSpPr>
+          <p:cNvPr id="3" name="Text Placeholder 2">
+            <a:extLst>
+              <a:ext uri="{FF2B5EF4-FFF2-40B4-BE49-F238E27FC236}">
+                <a16:creationId xmlns:a16="http://schemas.microsoft.com/office/drawing/2014/main" id="{58BE3078-8B89-4550-B497-93E4DADBD57E}"/>
+              </a:ext>
+            </a:extLst>
+          </p:cNvPr>
+          <p:cNvSpPr>
+            <a:spLocks noGrp="1"/>
+          </p:cNvSpPr>
+          <p:nvPr>
+            <p:ph type="body" idx="1"/>
+          </p:nvPr>
+        </p:nvSpPr>
+        <p:spPr>
+          <a:xfrm>
+            <a:off x="786150" y="1142608"/>
+            <a:ext cx="7571700" cy="3626431"/>
+          </a:xfrm>
+        </p:spPr>
+        <p:txBody>
+          <a:bodyPr/>
+          <a:lstStyle/>
+          <a:p>
+            <a:pPr marL="76200" indent="0">
+              <a:buNone/>
+            </a:pPr>
+            <a:r>
+              <a:rPr lang="en-US" sz="1400"/>
+              <a:t>Type Annotations</a:t>
+            </a:r>
+          </a:p>
+          <a:p>
+            <a:pPr marL="76200" indent="0">
+              <a:buNone/>
+            </a:pPr>
+            <a:r>
+              <a:rPr lang="en-US" sz="1100">
+                <a:latin typeface="Consolas" panose="020B0609020204030204" pitchFamily="49" charset="0"/>
+                <a:cs typeface="Courier New" panose="02070309020205020404" pitchFamily="49" charset="0"/>
+              </a:rPr>
+              <a:t>def fullName(firstName: str, lastName: str) -&gt; str:</a:t>
+            </a:r>
+          </a:p>
+          <a:p>
+            <a:pPr marL="76200" indent="0">
+              <a:buNone/>
+            </a:pPr>
+            <a:r>
+              <a:rPr lang="en-US" sz="1100">
+                <a:latin typeface="Consolas" panose="020B0609020204030204" pitchFamily="49" charset="0"/>
+                <a:cs typeface="Courier New" panose="02070309020205020404" pitchFamily="49" charset="0"/>
+              </a:rPr>
+              <a:t>    return f'{firstName.title()} {lastName.title()}'</a:t>
+            </a:r>
+          </a:p>
+          <a:p>
+            <a:pPr marL="76200" indent="0">
+              <a:buNone/>
+            </a:pPr>
+            <a:r>
+              <a:rPr lang="en-US" sz="1100">
+                <a:latin typeface="Consolas" panose="020B0609020204030204" pitchFamily="49" charset="0"/>
+                <a:cs typeface="Courier New" panose="02070309020205020404" pitchFamily="49" charset="0"/>
+              </a:rPr>
+              <a:t>print(fullName('Alireza', 'Nezhadshamsi'))</a:t>
+            </a:r>
+          </a:p>
+        </p:txBody>
+      </p:sp>
+      <p:sp>
+        <p:nvSpPr>
+          <p:cNvPr id="4" name="Slide Number Placeholder 3">
+            <a:extLst>
+              <a:ext uri="{FF2B5EF4-FFF2-40B4-BE49-F238E27FC236}">
+                <a16:creationId xmlns:a16="http://schemas.microsoft.com/office/drawing/2014/main" id="{64987AE6-EC0E-43DD-9376-95A5602EE5E1}"/>
+              </a:ext>
+            </a:extLst>
+          </p:cNvPr>
+          <p:cNvSpPr>
+            <a:spLocks noGrp="1"/>
+          </p:cNvSpPr>
+          <p:nvPr>
+            <p:ph type="sldNum" idx="12"/>
+          </p:nvPr>
+        </p:nvSpPr>
+        <p:spPr/>
+        <p:txBody>
+          <a:bodyPr/>
+          <a:lstStyle/>
+          <a:p>
+            <a:pPr marL="0" lvl="0" indent="0" algn="r" rtl="0">
+              <a:spcBef>
+                <a:spcPts val="0"/>
+              </a:spcBef>
+              <a:spcAft>
+                <a:spcPts val="0"/>
+              </a:spcAft>
+              <a:buNone/>
+            </a:pPr>
+            <a:fld id="{00000000-1234-1234-1234-123412341234}" type="slidenum">
+              <a:rPr lang="en" smtClean="0"/>
+              <a:t>27</a:t>
+            </a:fld>
+            <a:endParaRPr lang="en"/>
+          </a:p>
+        </p:txBody>
+      </p:sp>
+    </p:spTree>
+    <p:extLst>
+      <p:ext uri="{BB962C8B-B14F-4D97-AF65-F5344CB8AC3E}">
+        <p14:creationId xmlns:p14="http://schemas.microsoft.com/office/powerpoint/2010/main" val="812232462"/>
       </p:ext>
     </p:extLst>
   </p:cSld>
@@ -18149,7 +18460,7 @@
   <p:cSld>
     <p:spTree>
       <p:nvGrpSpPr>
-        <p:cNvPr id="1" name="Shape 96"/>
+        <p:cNvPr id="1" name=""/>
         <p:cNvGrpSpPr/>
         <p:nvPr/>
       </p:nvGrpSpPr>
@@ -18163,93 +18474,205 @@
       </p:grpSpPr>
       <p:sp>
         <p:nvSpPr>
-          <p:cNvPr id="97" name="Google Shape;97;p15"/>
-          <p:cNvSpPr txBox="1">
+          <p:cNvPr id="2" name="Title 1">
+            <a:extLst>
+              <a:ext uri="{FF2B5EF4-FFF2-40B4-BE49-F238E27FC236}">
+                <a16:creationId xmlns:a16="http://schemas.microsoft.com/office/drawing/2014/main" id="{024AD384-5AD1-4435-A943-1241B2FACD62}"/>
+              </a:ext>
+            </a:extLst>
+          </p:cNvPr>
+          <p:cNvSpPr>
             <a:spLocks noGrp="1"/>
           </p:cNvSpPr>
           <p:nvPr>
-            <p:ph type="ctrTitle"/>
+            <p:ph type="title"/>
+          </p:nvPr>
+        </p:nvSpPr>
+        <p:spPr/>
+        <p:txBody>
+          <a:bodyPr/>
+          <a:lstStyle/>
+          <a:p>
+            <a:r>
+              <a:rPr lang="en-US"/>
+              <a:t>Python Lambda</a:t>
+            </a:r>
+            <a:endParaRPr lang="fa-IR"/>
+          </a:p>
+        </p:txBody>
+      </p:sp>
+      <p:sp>
+        <p:nvSpPr>
+          <p:cNvPr id="3" name="Text Placeholder 2">
+            <a:extLst>
+              <a:ext uri="{FF2B5EF4-FFF2-40B4-BE49-F238E27FC236}">
+                <a16:creationId xmlns:a16="http://schemas.microsoft.com/office/drawing/2014/main" id="{58BE3078-8B89-4550-B497-93E4DADBD57E}"/>
+              </a:ext>
+            </a:extLst>
+          </p:cNvPr>
+          <p:cNvSpPr>
+            <a:spLocks noGrp="1"/>
+          </p:cNvSpPr>
+          <p:nvPr>
+            <p:ph type="body" idx="1"/>
           </p:nvPr>
         </p:nvSpPr>
         <p:spPr>
           <a:xfrm>
-            <a:off x="1655700" y="1991850"/>
-            <a:ext cx="5832600" cy="1159800"/>
+            <a:off x="786150" y="1142608"/>
+            <a:ext cx="7571700" cy="3626431"/>
           </a:xfrm>
-          <a:prstGeom prst="rect">
-            <a:avLst/>
-          </a:prstGeom>
         </p:spPr>
         <p:txBody>
-          <a:bodyPr spcFirstLastPara="1" wrap="square" lIns="91425" tIns="91425" rIns="91425" bIns="91425" anchor="ctr" anchorCtr="0">
-            <a:noAutofit/>
-          </a:bodyPr>
+          <a:bodyPr/>
           <a:lstStyle/>
           <a:p>
-            <a:pPr marL="0" lvl="0" indent="0" algn="ctr" rtl="0">
-              <a:spcBef>
-                <a:spcPts val="0"/>
-              </a:spcBef>
-              <a:spcAft>
-                <a:spcPts val="0"/>
-              </a:spcAft>
-              <a:buNone/>
-            </a:pPr>
-            <a:r>
-              <a:rPr lang="en-US" sz="6000">
+            <a:pPr marL="76200" indent="0">
+              <a:buNone/>
+            </a:pPr>
+            <a:r>
+              <a:rPr lang="en-US" sz="1400"/>
+              <a:t>Small anonymous functions</a:t>
+            </a:r>
+          </a:p>
+          <a:p>
+            <a:pPr marL="76200" indent="0">
+              <a:buNone/>
+            </a:pPr>
+            <a:r>
+              <a:rPr lang="en-US" sz="1100">
+                <a:latin typeface="Consolas" panose="020B0609020204030204" pitchFamily="49" charset="0"/>
+                <a:cs typeface="Courier New" panose="02070309020205020404" pitchFamily="49" charset="0"/>
+              </a:rPr>
+              <a:t>greeter = </a:t>
+            </a:r>
+            <a:r>
+              <a:rPr lang="en-US" sz="1100">
                 <a:solidFill>
-                  <a:srgbClr val="E6E6E6"/>
+                  <a:schemeClr val="accent1"/>
                 </a:solidFill>
-              </a:rPr>
-              <a:t>3</a:t>
-            </a:r>
-            <a:endParaRPr sz="6000">
-              <a:solidFill>
-                <a:srgbClr val="E6E6E6"/>
-              </a:solidFill>
+                <a:latin typeface="Consolas" panose="020B0609020204030204" pitchFamily="49" charset="0"/>
+                <a:cs typeface="Courier New" panose="02070309020205020404" pitchFamily="49" charset="0"/>
+              </a:rPr>
+              <a:t>lambda:</a:t>
+            </a:r>
+            <a:r>
+              <a:rPr lang="en-US" sz="1100">
+                <a:latin typeface="Consolas" panose="020B0609020204030204" pitchFamily="49" charset="0"/>
+                <a:cs typeface="Courier New" panose="02070309020205020404" pitchFamily="49" charset="0"/>
+              </a:rPr>
+              <a:t> print('Hello')</a:t>
+            </a:r>
+          </a:p>
+          <a:p>
+            <a:pPr marL="76200" indent="0">
+              <a:buNone/>
+            </a:pPr>
+            <a:r>
+              <a:rPr lang="en-US" sz="1100">
+                <a:latin typeface="Consolas" panose="020B0609020204030204" pitchFamily="49" charset="0"/>
+                <a:cs typeface="Courier New" panose="02070309020205020404" pitchFamily="49" charset="0"/>
+              </a:rPr>
+              <a:t>print(greeter())</a:t>
+            </a:r>
+          </a:p>
+          <a:p>
+            <a:pPr marL="76200" indent="0">
+              <a:buNone/>
+            </a:pPr>
+            <a:endParaRPr lang="en-US" sz="1100">
+              <a:latin typeface="Consolas" panose="020B0609020204030204" pitchFamily="49" charset="0"/>
+              <a:cs typeface="Courier New" panose="02070309020205020404" pitchFamily="49" charset="0"/>
             </a:endParaRPr>
           </a:p>
           <a:p>
-            <a:pPr marL="0" lvl="0" indent="0" algn="ctr" rtl="0">
-              <a:spcBef>
-                <a:spcPts val="0"/>
-              </a:spcBef>
-              <a:spcAft>
-                <a:spcPts val="0"/>
-              </a:spcAft>
-              <a:buNone/>
-            </a:pPr>
-            <a:r>
-              <a:rPr lang="en"/>
-              <a:t>Pandas</a:t>
-            </a:r>
-            <a:endParaRPr/>
+            <a:pPr marL="76200" indent="0">
+              <a:buNone/>
+            </a:pPr>
+            <a:r>
+              <a:rPr lang="en-US" sz="1400"/>
+              <a:t>Arguments </a:t>
+            </a:r>
+          </a:p>
+          <a:p>
+            <a:pPr marL="76200" indent="0">
+              <a:buNone/>
+            </a:pPr>
+            <a:r>
+              <a:rPr lang="en-US" sz="1100">
+                <a:latin typeface="Consolas" panose="020B0609020204030204" pitchFamily="49" charset="0"/>
+                <a:cs typeface="Courier New" panose="02070309020205020404" pitchFamily="49" charset="0"/>
+              </a:rPr>
+              <a:t>greeter = (lambda name </a:t>
+            </a:r>
+            <a:r>
+              <a:rPr lang="en-US" sz="1100">
+                <a:solidFill>
+                  <a:schemeClr val="accent1"/>
+                </a:solidFill>
+                <a:latin typeface="Consolas" panose="020B0609020204030204" pitchFamily="49" charset="0"/>
+                <a:cs typeface="Courier New" panose="02070309020205020404" pitchFamily="49" charset="0"/>
+              </a:rPr>
+              <a:t>=</a:t>
+            </a:r>
+            <a:r>
+              <a:rPr lang="en-US" sz="1100">
+                <a:latin typeface="Consolas" panose="020B0609020204030204" pitchFamily="49" charset="0"/>
+                <a:cs typeface="Courier New" panose="02070309020205020404" pitchFamily="49" charset="0"/>
+              </a:rPr>
+              <a:t> 'Dear user': f'Hello {name}!')</a:t>
+            </a:r>
+          </a:p>
+          <a:p>
+            <a:pPr marL="76200" indent="0">
+              <a:buNone/>
+            </a:pPr>
+            <a:r>
+              <a:rPr lang="en-US" sz="1100">
+                <a:latin typeface="Consolas" panose="020B0609020204030204" pitchFamily="49" charset="0"/>
+                <a:cs typeface="Courier New" panose="02070309020205020404" pitchFamily="49" charset="0"/>
+              </a:rPr>
+              <a:t>print(greeter(name </a:t>
+            </a:r>
+            <a:r>
+              <a:rPr lang="en-US" sz="1100">
+                <a:solidFill>
+                  <a:schemeClr val="accent1"/>
+                </a:solidFill>
+                <a:latin typeface="Consolas" panose="020B0609020204030204" pitchFamily="49" charset="0"/>
+                <a:cs typeface="Courier New" panose="02070309020205020404" pitchFamily="49" charset="0"/>
+              </a:rPr>
+              <a:t>=</a:t>
+            </a:r>
+            <a:r>
+              <a:rPr lang="en-US" sz="1100">
+                <a:latin typeface="Consolas" panose="020B0609020204030204" pitchFamily="49" charset="0"/>
+                <a:cs typeface="Courier New" panose="02070309020205020404" pitchFamily="49" charset="0"/>
+              </a:rPr>
+              <a:t> 'Alireza'))</a:t>
+            </a:r>
           </a:p>
         </p:txBody>
       </p:sp>
       <p:sp>
         <p:nvSpPr>
-          <p:cNvPr id="99" name="Google Shape;99;p15"/>
-          <p:cNvSpPr txBox="1">
+          <p:cNvPr id="4" name="Slide Number Placeholder 3">
+            <a:extLst>
+              <a:ext uri="{FF2B5EF4-FFF2-40B4-BE49-F238E27FC236}">
+                <a16:creationId xmlns:a16="http://schemas.microsoft.com/office/drawing/2014/main" id="{64987AE6-EC0E-43DD-9376-95A5602EE5E1}"/>
+              </a:ext>
+            </a:extLst>
+          </p:cNvPr>
+          <p:cNvSpPr>
             <a:spLocks noGrp="1"/>
           </p:cNvSpPr>
           <p:nvPr>
-            <p:ph type="sldNum" idx="4294967295"/>
+            <p:ph type="sldNum" idx="12"/>
           </p:nvPr>
         </p:nvSpPr>
-        <p:spPr>
-          <a:xfrm>
-            <a:off x="8404384" y="4749851"/>
-            <a:ext cx="548700" cy="393600"/>
-          </a:xfrm>
-          <a:prstGeom prst="rect">
-            <a:avLst/>
-          </a:prstGeom>
-        </p:spPr>
+        <p:spPr/>
         <p:txBody>
-          <a:bodyPr spcFirstLastPara="1" wrap="square" lIns="91425" tIns="91425" rIns="91425" bIns="91425" anchor="t" anchorCtr="0">
-            <a:noAutofit/>
-          </a:bodyPr>
+          <a:bodyPr/>
           <a:lstStyle/>
           <a:p>
             <a:pPr marL="0" lvl="0" indent="0" algn="r" rtl="0">
@@ -18262,17 +18685,17 @@
               <a:buNone/>
             </a:pPr>
             <a:fld id="{00000000-1234-1234-1234-123412341234}" type="slidenum">
-              <a:rPr lang="en"/>
+              <a:rPr lang="en" smtClean="0"/>
               <a:t>28</a:t>
             </a:fld>
-            <a:endParaRPr/>
+            <a:endParaRPr lang="en"/>
           </a:p>
         </p:txBody>
       </p:sp>
     </p:spTree>
     <p:extLst>
       <p:ext uri="{BB962C8B-B14F-4D97-AF65-F5344CB8AC3E}">
-        <p14:creationId xmlns:p14="http://schemas.microsoft.com/office/powerpoint/2010/main" val="2729265455"/>
+        <p14:creationId xmlns:p14="http://schemas.microsoft.com/office/powerpoint/2010/main" val="801939220"/>
       </p:ext>
     </p:extLst>
   </p:cSld>
@@ -18283,11 +18706,11 @@
 </file>
 
 <file path=ppt/slides/slide29.xml><?xml version="1.0" encoding="utf-8"?>
-<p:sld xmlns:a="http://schemas.openxmlformats.org/drawingml/2006/main" xmlns:r="http://schemas.openxmlformats.org/officeDocument/2006/relationships" xmlns:p="http://schemas.openxmlformats.org/presentationml/2006/main">
+<p:sld xmlns:a="http://schemas.openxmlformats.org/drawingml/2006/main" xmlns:r="http://schemas.openxmlformats.org/officeDocument/2006/relationships" xmlns:p="http://schemas.openxmlformats.org/presentationml/2006/main" show="0">
   <p:cSld>
     <p:spTree>
       <p:nvGrpSpPr>
-        <p:cNvPr id="1" name="Shape 96"/>
+        <p:cNvPr id="1" name=""/>
         <p:cNvGrpSpPr/>
         <p:nvPr/>
       </p:nvGrpSpPr>
@@ -18301,93 +18724,157 @@
       </p:grpSpPr>
       <p:sp>
         <p:nvSpPr>
-          <p:cNvPr id="97" name="Google Shape;97;p15"/>
-          <p:cNvSpPr txBox="1">
+          <p:cNvPr id="2" name="Title 1">
+            <a:extLst>
+              <a:ext uri="{FF2B5EF4-FFF2-40B4-BE49-F238E27FC236}">
+                <a16:creationId xmlns:a16="http://schemas.microsoft.com/office/drawing/2014/main" id="{024AD384-5AD1-4435-A943-1241B2FACD62}"/>
+              </a:ext>
+            </a:extLst>
+          </p:cNvPr>
+          <p:cNvSpPr>
             <a:spLocks noGrp="1"/>
           </p:cNvSpPr>
           <p:nvPr>
-            <p:ph type="ctrTitle"/>
+            <p:ph type="title"/>
+          </p:nvPr>
+        </p:nvSpPr>
+        <p:spPr/>
+        <p:txBody>
+          <a:bodyPr/>
+          <a:lstStyle/>
+          <a:p>
+            <a:r>
+              <a:rPr lang="en-US"/>
+              <a:t>Python Lambda</a:t>
+            </a:r>
+            <a:endParaRPr lang="fa-IR"/>
+          </a:p>
+        </p:txBody>
+      </p:sp>
+      <p:sp>
+        <p:nvSpPr>
+          <p:cNvPr id="3" name="Text Placeholder 2">
+            <a:extLst>
+              <a:ext uri="{FF2B5EF4-FFF2-40B4-BE49-F238E27FC236}">
+                <a16:creationId xmlns:a16="http://schemas.microsoft.com/office/drawing/2014/main" id="{58BE3078-8B89-4550-B497-93E4DADBD57E}"/>
+              </a:ext>
+            </a:extLst>
+          </p:cNvPr>
+          <p:cNvSpPr>
+            <a:spLocks noGrp="1"/>
+          </p:cNvSpPr>
+          <p:nvPr>
+            <p:ph type="body" idx="1"/>
           </p:nvPr>
         </p:nvSpPr>
         <p:spPr>
           <a:xfrm>
-            <a:off x="1655700" y="1991850"/>
-            <a:ext cx="5832600" cy="1159800"/>
+            <a:off x="786150" y="1142608"/>
+            <a:ext cx="7571700" cy="3626431"/>
           </a:xfrm>
-          <a:prstGeom prst="rect">
-            <a:avLst/>
-          </a:prstGeom>
         </p:spPr>
         <p:txBody>
-          <a:bodyPr spcFirstLastPara="1" wrap="square" lIns="91425" tIns="91425" rIns="91425" bIns="91425" anchor="ctr" anchorCtr="0">
-            <a:noAutofit/>
-          </a:bodyPr>
+          <a:bodyPr/>
           <a:lstStyle/>
           <a:p>
-            <a:pPr marL="0" lvl="0" indent="0" algn="ctr" rtl="0">
-              <a:spcBef>
-                <a:spcPts val="0"/>
-              </a:spcBef>
-              <a:spcAft>
-                <a:spcPts val="0"/>
-              </a:spcAft>
-              <a:buNone/>
-            </a:pPr>
-            <a:r>
-              <a:rPr lang="en-US" sz="6000">
-                <a:solidFill>
-                  <a:srgbClr val="E6E6E6"/>
-                </a:solidFill>
-              </a:rPr>
-              <a:t>4</a:t>
-            </a:r>
-            <a:endParaRPr sz="6000">
-              <a:solidFill>
-                <a:srgbClr val="E6E6E6"/>
-              </a:solidFill>
-            </a:endParaRPr>
-          </a:p>
-          <a:p>
-            <a:pPr marL="0" lvl="0" indent="0" algn="ctr" rtl="0">
-              <a:spcBef>
-                <a:spcPts val="0"/>
-              </a:spcBef>
-              <a:spcAft>
-                <a:spcPts val="0"/>
-              </a:spcAft>
-              <a:buNone/>
-            </a:pPr>
-            <a:r>
-              <a:rPr lang="en"/>
-              <a:t>Matplotlib</a:t>
-            </a:r>
-            <a:endParaRPr/>
+            <a:pPr marL="76200" indent="0">
+              <a:buNone/>
+            </a:pPr>
+            <a:r>
+              <a:rPr lang="en-US" sz="1400"/>
+              <a:t>Nested lambda</a:t>
+            </a:r>
+          </a:p>
+          <a:p>
+            <a:pPr marL="76200" indent="0">
+              <a:buNone/>
+            </a:pPr>
+            <a:r>
+              <a:rPr lang="en-US" sz="1100">
+                <a:latin typeface="Consolas" panose="020B0609020204030204" pitchFamily="49" charset="0"/>
+                <a:cs typeface="Courier New" panose="02070309020205020404" pitchFamily="49" charset="0"/>
+              </a:rPr>
+              <a:t>high_ord_func = lambda x, func: x + func(x)</a:t>
+            </a:r>
+          </a:p>
+          <a:p>
+            <a:pPr marL="76200" indent="0">
+              <a:buNone/>
+            </a:pPr>
+            <a:r>
+              <a:rPr lang="en-US" sz="1100">
+                <a:latin typeface="Consolas" panose="020B0609020204030204" pitchFamily="49" charset="0"/>
+                <a:cs typeface="Courier New" panose="02070309020205020404" pitchFamily="49" charset="0"/>
+              </a:rPr>
+              <a:t>high_ord_func(2, lambda x: x * 2)</a:t>
+            </a:r>
+          </a:p>
+          <a:p>
+            <a:pPr marL="76200" indent="0">
+              <a:buNone/>
+            </a:pPr>
+            <a:r>
+              <a:rPr lang="en-US" sz="1100">
+                <a:latin typeface="Consolas" panose="020B0609020204030204" pitchFamily="49" charset="0"/>
+                <a:cs typeface="Courier New" panose="02070309020205020404" pitchFamily="49" charset="0"/>
+              </a:rPr>
+              <a:t>high_ord_func(2, lambda x: x * x)</a:t>
+            </a:r>
+          </a:p>
+          <a:p>
+            <a:pPr marL="76200" indent="0">
+              <a:buNone/>
+            </a:pPr>
+            <a:endParaRPr lang="en-US" sz="1400"/>
+          </a:p>
+          <a:p>
+            <a:pPr marL="76200" indent="0">
+              <a:buNone/>
+            </a:pPr>
+            <a:endParaRPr lang="en-US" sz="1400"/>
+          </a:p>
+          <a:p>
+            <a:pPr marL="76200" indent="0">
+              <a:buNone/>
+            </a:pPr>
+            <a:r>
+              <a:rPr lang="en-US" sz="1400"/>
+              <a:t>Single Expression</a:t>
+            </a:r>
+          </a:p>
+          <a:p>
+            <a:pPr marL="76200" indent="0">
+              <a:buNone/>
+            </a:pPr>
+            <a:r>
+              <a:rPr lang="en-US" sz="1100">
+                <a:latin typeface="Consolas" panose="020B0609020204030204" pitchFamily="49" charset="0"/>
+                <a:cs typeface="Courier New" panose="02070309020205020404" pitchFamily="49" charset="0"/>
+              </a:rPr>
+              <a:t>(lambda x: (x % 2 and 'odd' or 'even'))(7)</a:t>
+            </a:r>
           </a:p>
         </p:txBody>
       </p:sp>
       <p:sp>
         <p:nvSpPr>
-          <p:cNvPr id="99" name="Google Shape;99;p15"/>
-          <p:cNvSpPr txBox="1">
+          <p:cNvPr id="4" name="Slide Number Placeholder 3">
+            <a:extLst>
+              <a:ext uri="{FF2B5EF4-FFF2-40B4-BE49-F238E27FC236}">
+                <a16:creationId xmlns:a16="http://schemas.microsoft.com/office/drawing/2014/main" id="{64987AE6-EC0E-43DD-9376-95A5602EE5E1}"/>
+              </a:ext>
+            </a:extLst>
+          </p:cNvPr>
+          <p:cNvSpPr>
             <a:spLocks noGrp="1"/>
           </p:cNvSpPr>
           <p:nvPr>
-            <p:ph type="sldNum" idx="4294967295"/>
+            <p:ph type="sldNum" idx="12"/>
           </p:nvPr>
         </p:nvSpPr>
-        <p:spPr>
-          <a:xfrm>
-            <a:off x="8404384" y="4749851"/>
-            <a:ext cx="548700" cy="393600"/>
-          </a:xfrm>
-          <a:prstGeom prst="rect">
-            <a:avLst/>
-          </a:prstGeom>
-        </p:spPr>
+        <p:spPr/>
         <p:txBody>
-          <a:bodyPr spcFirstLastPara="1" wrap="square" lIns="91425" tIns="91425" rIns="91425" bIns="91425" anchor="t" anchorCtr="0">
-            <a:noAutofit/>
-          </a:bodyPr>
+          <a:bodyPr/>
           <a:lstStyle/>
           <a:p>
             <a:pPr marL="0" lvl="0" indent="0" algn="r" rtl="0">
@@ -18400,17 +18887,17 @@
               <a:buNone/>
             </a:pPr>
             <a:fld id="{00000000-1234-1234-1234-123412341234}" type="slidenum">
-              <a:rPr lang="en"/>
+              <a:rPr lang="en" smtClean="0"/>
               <a:t>29</a:t>
             </a:fld>
-            <a:endParaRPr/>
+            <a:endParaRPr lang="en"/>
           </a:p>
         </p:txBody>
       </p:sp>
     </p:spTree>
     <p:extLst>
       <p:ext uri="{BB962C8B-B14F-4D97-AF65-F5344CB8AC3E}">
-        <p14:creationId xmlns:p14="http://schemas.microsoft.com/office/powerpoint/2010/main" val="2458102878"/>
+        <p14:creationId xmlns:p14="http://schemas.microsoft.com/office/powerpoint/2010/main" val="774862470"/>
       </p:ext>
     </p:extLst>
   </p:cSld>
@@ -18689,7 +19176,7 @@
                   <a:srgbClr val="E6E6E6"/>
                 </a:solidFill>
               </a:rPr>
-              <a:t>5</a:t>
+              <a:t>0</a:t>
             </a:r>
             <a:endParaRPr sz="6000">
               <a:solidFill>
@@ -18698,13 +19185,18 @@
             </a:endParaRPr>
           </a:p>
           <a:p>
-            <a:r>
-              <a:rPr lang="en-US"/>
-              <a:t>S</a:t>
-            </a:r>
-            <a:r>
-              <a:rPr lang="en-US" b="1"/>
-              <a:t>cikit-learn</a:t>
+            <a:pPr marL="0" lvl="0" indent="0" algn="ctr" rtl="0">
+              <a:spcBef>
+                <a:spcPts val="0"/>
+              </a:spcBef>
+              <a:spcAft>
+                <a:spcPts val="0"/>
+              </a:spcAft>
+              <a:buNone/>
+            </a:pPr>
+            <a:r>
+              <a:rPr lang="en"/>
+              <a:t>Basics</a:t>
             </a:r>
             <a:endParaRPr/>
           </a:p>
@@ -18753,11 +19245,6 @@
         </p:txBody>
       </p:sp>
     </p:spTree>
-    <p:extLst>
-      <p:ext uri="{BB962C8B-B14F-4D97-AF65-F5344CB8AC3E}">
-        <p14:creationId xmlns:p14="http://schemas.microsoft.com/office/powerpoint/2010/main" val="3753200419"/>
-      </p:ext>
-    </p:extLst>
   </p:cSld>
   <p:clrMapOvr>
     <a:masterClrMapping/>
@@ -18822,7 +19309,7 @@
                   <a:srgbClr val="E6E6E6"/>
                 </a:solidFill>
               </a:rPr>
-              <a:t>6</a:t>
+              <a:t>2</a:t>
             </a:r>
             <a:endParaRPr sz="6000">
               <a:solidFill>
@@ -18831,11 +19318,18 @@
             </a:endParaRPr>
           </a:p>
           <a:p>
-            <a:r>
-              <a:rPr lang="en-US">
-                <a:effectLst/>
-              </a:rPr>
-              <a:t>Web Scraping</a:t>
+            <a:pPr marL="0" lvl="0" indent="0" algn="ctr" rtl="0">
+              <a:spcBef>
+                <a:spcPts val="0"/>
+              </a:spcBef>
+              <a:spcAft>
+                <a:spcPts val="0"/>
+              </a:spcAft>
+              <a:buNone/>
+            </a:pPr>
+            <a:r>
+              <a:rPr lang="en"/>
+              <a:t>NumPy</a:t>
             </a:r>
             <a:endParaRPr/>
           </a:p>
@@ -18886,6 +19380,698 @@
     </p:spTree>
     <p:extLst>
       <p:ext uri="{BB962C8B-B14F-4D97-AF65-F5344CB8AC3E}">
+        <p14:creationId xmlns:p14="http://schemas.microsoft.com/office/powerpoint/2010/main" val="1620004517"/>
+      </p:ext>
+    </p:extLst>
+  </p:cSld>
+  <p:clrMapOvr>
+    <a:masterClrMapping/>
+  </p:clrMapOvr>
+</p:sld>
+</file>
+
+<file path=ppt/slides/slide32.xml><?xml version="1.0" encoding="utf-8"?>
+<p:sld xmlns:a="http://schemas.openxmlformats.org/drawingml/2006/main" xmlns:r="http://schemas.openxmlformats.org/officeDocument/2006/relationships" xmlns:p="http://schemas.openxmlformats.org/presentationml/2006/main">
+  <p:cSld>
+    <p:spTree>
+      <p:nvGrpSpPr>
+        <p:cNvPr id="1" name=""/>
+        <p:cNvGrpSpPr/>
+        <p:nvPr/>
+      </p:nvGrpSpPr>
+      <p:grpSpPr>
+        <a:xfrm>
+          <a:off x="0" y="0"/>
+          <a:ext cx="0" cy="0"/>
+          <a:chOff x="0" y="0"/>
+          <a:chExt cx="0" cy="0"/>
+        </a:xfrm>
+      </p:grpSpPr>
+      <p:sp>
+        <p:nvSpPr>
+          <p:cNvPr id="2" name="Title 1">
+            <a:extLst>
+              <a:ext uri="{FF2B5EF4-FFF2-40B4-BE49-F238E27FC236}">
+                <a16:creationId xmlns:a16="http://schemas.microsoft.com/office/drawing/2014/main" id="{024AD384-5AD1-4435-A943-1241B2FACD62}"/>
+              </a:ext>
+            </a:extLst>
+          </p:cNvPr>
+          <p:cNvSpPr>
+            <a:spLocks noGrp="1"/>
+          </p:cNvSpPr>
+          <p:nvPr>
+            <p:ph type="title"/>
+          </p:nvPr>
+        </p:nvSpPr>
+        <p:spPr/>
+        <p:txBody>
+          <a:bodyPr/>
+          <a:lstStyle/>
+          <a:p>
+            <a:r>
+              <a:rPr lang="en-US" err="1"/>
+              <a:t>Numpy</a:t>
+            </a:r>
+            <a:r>
+              <a:rPr lang="en-US"/>
+              <a:t> Introduction</a:t>
+            </a:r>
+            <a:endParaRPr lang="fa-IR"/>
+          </a:p>
+        </p:txBody>
+      </p:sp>
+      <p:sp>
+        <p:nvSpPr>
+          <p:cNvPr id="3" name="Text Placeholder 2">
+            <a:extLst>
+              <a:ext uri="{FF2B5EF4-FFF2-40B4-BE49-F238E27FC236}">
+                <a16:creationId xmlns:a16="http://schemas.microsoft.com/office/drawing/2014/main" id="{58BE3078-8B89-4550-B497-93E4DADBD57E}"/>
+              </a:ext>
+            </a:extLst>
+          </p:cNvPr>
+          <p:cNvSpPr>
+            <a:spLocks noGrp="1"/>
+          </p:cNvSpPr>
+          <p:nvPr>
+            <p:ph type="body" idx="1"/>
+          </p:nvPr>
+        </p:nvSpPr>
+        <p:spPr>
+          <a:xfrm>
+            <a:off x="786150" y="1142608"/>
+            <a:ext cx="7571700" cy="3626431"/>
+          </a:xfrm>
+        </p:spPr>
+        <p:txBody>
+          <a:bodyPr/>
+          <a:lstStyle/>
+          <a:p>
+            <a:pPr marL="76200" indent="0">
+              <a:buNone/>
+            </a:pPr>
+            <a:r>
+              <a:rPr lang="en-US" sz="1400"/>
+              <a:t>NumPy is a Python library used for working with arrays.</a:t>
+            </a:r>
+          </a:p>
+          <a:p>
+            <a:pPr marL="76200" indent="0">
+              <a:buNone/>
+            </a:pPr>
+            <a:endParaRPr lang="en-US" sz="1400"/>
+          </a:p>
+          <a:p>
+            <a:pPr marL="76200" indent="0">
+              <a:buNone/>
+            </a:pPr>
+            <a:r>
+              <a:rPr lang="en-US" sz="1400"/>
+              <a:t>NumPy is short for Numerical Python.</a:t>
+            </a:r>
+          </a:p>
+        </p:txBody>
+      </p:sp>
+      <p:sp>
+        <p:nvSpPr>
+          <p:cNvPr id="4" name="Slide Number Placeholder 3">
+            <a:extLst>
+              <a:ext uri="{FF2B5EF4-FFF2-40B4-BE49-F238E27FC236}">
+                <a16:creationId xmlns:a16="http://schemas.microsoft.com/office/drawing/2014/main" id="{64987AE6-EC0E-43DD-9376-95A5602EE5E1}"/>
+              </a:ext>
+            </a:extLst>
+          </p:cNvPr>
+          <p:cNvSpPr>
+            <a:spLocks noGrp="1"/>
+          </p:cNvSpPr>
+          <p:nvPr>
+            <p:ph type="sldNum" idx="12"/>
+          </p:nvPr>
+        </p:nvSpPr>
+        <p:spPr/>
+        <p:txBody>
+          <a:bodyPr/>
+          <a:lstStyle/>
+          <a:p>
+            <a:pPr marL="0" lvl="0" indent="0" algn="r" rtl="0">
+              <a:spcBef>
+                <a:spcPts val="0"/>
+              </a:spcBef>
+              <a:spcAft>
+                <a:spcPts val="0"/>
+              </a:spcAft>
+              <a:buNone/>
+            </a:pPr>
+            <a:fld id="{00000000-1234-1234-1234-123412341234}" type="slidenum">
+              <a:rPr lang="en" smtClean="0"/>
+              <a:t>32</a:t>
+            </a:fld>
+            <a:endParaRPr lang="en"/>
+          </a:p>
+        </p:txBody>
+      </p:sp>
+    </p:spTree>
+    <p:extLst>
+      <p:ext uri="{BB962C8B-B14F-4D97-AF65-F5344CB8AC3E}">
+        <p14:creationId xmlns:p14="http://schemas.microsoft.com/office/powerpoint/2010/main" val="4156460407"/>
+      </p:ext>
+    </p:extLst>
+  </p:cSld>
+  <p:clrMapOvr>
+    <a:masterClrMapping/>
+  </p:clrMapOvr>
+</p:sld>
+</file>
+
+<file path=ppt/slides/slide33.xml><?xml version="1.0" encoding="utf-8"?>
+<p:sld xmlns:a="http://schemas.openxmlformats.org/drawingml/2006/main" xmlns:r="http://schemas.openxmlformats.org/officeDocument/2006/relationships" xmlns:p="http://schemas.openxmlformats.org/presentationml/2006/main">
+  <p:cSld>
+    <p:spTree>
+      <p:nvGrpSpPr>
+        <p:cNvPr id="1" name="Shape 96"/>
+        <p:cNvGrpSpPr/>
+        <p:nvPr/>
+      </p:nvGrpSpPr>
+      <p:grpSpPr>
+        <a:xfrm>
+          <a:off x="0" y="0"/>
+          <a:ext cx="0" cy="0"/>
+          <a:chOff x="0" y="0"/>
+          <a:chExt cx="0" cy="0"/>
+        </a:xfrm>
+      </p:grpSpPr>
+      <p:sp>
+        <p:nvSpPr>
+          <p:cNvPr id="97" name="Google Shape;97;p15"/>
+          <p:cNvSpPr txBox="1">
+            <a:spLocks noGrp="1"/>
+          </p:cNvSpPr>
+          <p:nvPr>
+            <p:ph type="ctrTitle"/>
+          </p:nvPr>
+        </p:nvSpPr>
+        <p:spPr>
+          <a:xfrm>
+            <a:off x="1655700" y="1991850"/>
+            <a:ext cx="5832600" cy="1159800"/>
+          </a:xfrm>
+          <a:prstGeom prst="rect">
+            <a:avLst/>
+          </a:prstGeom>
+        </p:spPr>
+        <p:txBody>
+          <a:bodyPr spcFirstLastPara="1" wrap="square" lIns="91425" tIns="91425" rIns="91425" bIns="91425" anchor="ctr" anchorCtr="0">
+            <a:noAutofit/>
+          </a:bodyPr>
+          <a:lstStyle/>
+          <a:p>
+            <a:pPr marL="0" lvl="0" indent="0" algn="ctr" rtl="0">
+              <a:spcBef>
+                <a:spcPts val="0"/>
+              </a:spcBef>
+              <a:spcAft>
+                <a:spcPts val="0"/>
+              </a:spcAft>
+              <a:buNone/>
+            </a:pPr>
+            <a:r>
+              <a:rPr lang="en-US" sz="6000">
+                <a:solidFill>
+                  <a:srgbClr val="E6E6E6"/>
+                </a:solidFill>
+              </a:rPr>
+              <a:t>3</a:t>
+            </a:r>
+            <a:endParaRPr sz="6000">
+              <a:solidFill>
+                <a:srgbClr val="E6E6E6"/>
+              </a:solidFill>
+            </a:endParaRPr>
+          </a:p>
+          <a:p>
+            <a:pPr marL="0" lvl="0" indent="0" algn="ctr" rtl="0">
+              <a:spcBef>
+                <a:spcPts val="0"/>
+              </a:spcBef>
+              <a:spcAft>
+                <a:spcPts val="0"/>
+              </a:spcAft>
+              <a:buNone/>
+            </a:pPr>
+            <a:r>
+              <a:rPr lang="en"/>
+              <a:t>Pandas</a:t>
+            </a:r>
+            <a:endParaRPr/>
+          </a:p>
+        </p:txBody>
+      </p:sp>
+      <p:sp>
+        <p:nvSpPr>
+          <p:cNvPr id="99" name="Google Shape;99;p15"/>
+          <p:cNvSpPr txBox="1">
+            <a:spLocks noGrp="1"/>
+          </p:cNvSpPr>
+          <p:nvPr>
+            <p:ph type="sldNum" idx="4294967295"/>
+          </p:nvPr>
+        </p:nvSpPr>
+        <p:spPr>
+          <a:xfrm>
+            <a:off x="8404384" y="4749851"/>
+            <a:ext cx="548700" cy="393600"/>
+          </a:xfrm>
+          <a:prstGeom prst="rect">
+            <a:avLst/>
+          </a:prstGeom>
+        </p:spPr>
+        <p:txBody>
+          <a:bodyPr spcFirstLastPara="1" wrap="square" lIns="91425" tIns="91425" rIns="91425" bIns="91425" anchor="t" anchorCtr="0">
+            <a:noAutofit/>
+          </a:bodyPr>
+          <a:lstStyle/>
+          <a:p>
+            <a:pPr marL="0" lvl="0" indent="0" algn="r" rtl="0">
+              <a:spcBef>
+                <a:spcPts val="0"/>
+              </a:spcBef>
+              <a:spcAft>
+                <a:spcPts val="0"/>
+              </a:spcAft>
+              <a:buNone/>
+            </a:pPr>
+            <a:fld id="{00000000-1234-1234-1234-123412341234}" type="slidenum">
+              <a:rPr lang="en"/>
+              <a:t>33</a:t>
+            </a:fld>
+            <a:endParaRPr/>
+          </a:p>
+        </p:txBody>
+      </p:sp>
+    </p:spTree>
+    <p:extLst>
+      <p:ext uri="{BB962C8B-B14F-4D97-AF65-F5344CB8AC3E}">
+        <p14:creationId xmlns:p14="http://schemas.microsoft.com/office/powerpoint/2010/main" val="2729265455"/>
+      </p:ext>
+    </p:extLst>
+  </p:cSld>
+  <p:clrMapOvr>
+    <a:masterClrMapping/>
+  </p:clrMapOvr>
+</p:sld>
+</file>
+
+<file path=ppt/slides/slide34.xml><?xml version="1.0" encoding="utf-8"?>
+<p:sld xmlns:a="http://schemas.openxmlformats.org/drawingml/2006/main" xmlns:r="http://schemas.openxmlformats.org/officeDocument/2006/relationships" xmlns:p="http://schemas.openxmlformats.org/presentationml/2006/main">
+  <p:cSld>
+    <p:spTree>
+      <p:nvGrpSpPr>
+        <p:cNvPr id="1" name="Shape 96"/>
+        <p:cNvGrpSpPr/>
+        <p:nvPr/>
+      </p:nvGrpSpPr>
+      <p:grpSpPr>
+        <a:xfrm>
+          <a:off x="0" y="0"/>
+          <a:ext cx="0" cy="0"/>
+          <a:chOff x="0" y="0"/>
+          <a:chExt cx="0" cy="0"/>
+        </a:xfrm>
+      </p:grpSpPr>
+      <p:sp>
+        <p:nvSpPr>
+          <p:cNvPr id="97" name="Google Shape;97;p15"/>
+          <p:cNvSpPr txBox="1">
+            <a:spLocks noGrp="1"/>
+          </p:cNvSpPr>
+          <p:nvPr>
+            <p:ph type="ctrTitle"/>
+          </p:nvPr>
+        </p:nvSpPr>
+        <p:spPr>
+          <a:xfrm>
+            <a:off x="1655700" y="1991850"/>
+            <a:ext cx="5832600" cy="1159800"/>
+          </a:xfrm>
+          <a:prstGeom prst="rect">
+            <a:avLst/>
+          </a:prstGeom>
+        </p:spPr>
+        <p:txBody>
+          <a:bodyPr spcFirstLastPara="1" wrap="square" lIns="91425" tIns="91425" rIns="91425" bIns="91425" anchor="ctr" anchorCtr="0">
+            <a:noAutofit/>
+          </a:bodyPr>
+          <a:lstStyle/>
+          <a:p>
+            <a:pPr marL="0" lvl="0" indent="0" algn="ctr" rtl="0">
+              <a:spcBef>
+                <a:spcPts val="0"/>
+              </a:spcBef>
+              <a:spcAft>
+                <a:spcPts val="0"/>
+              </a:spcAft>
+              <a:buNone/>
+            </a:pPr>
+            <a:r>
+              <a:rPr lang="en-US" sz="6000">
+                <a:solidFill>
+                  <a:srgbClr val="E6E6E6"/>
+                </a:solidFill>
+              </a:rPr>
+              <a:t>4</a:t>
+            </a:r>
+            <a:endParaRPr sz="6000">
+              <a:solidFill>
+                <a:srgbClr val="E6E6E6"/>
+              </a:solidFill>
+            </a:endParaRPr>
+          </a:p>
+          <a:p>
+            <a:pPr marL="0" lvl="0" indent="0" algn="ctr" rtl="0">
+              <a:spcBef>
+                <a:spcPts val="0"/>
+              </a:spcBef>
+              <a:spcAft>
+                <a:spcPts val="0"/>
+              </a:spcAft>
+              <a:buNone/>
+            </a:pPr>
+            <a:r>
+              <a:rPr lang="en"/>
+              <a:t>Matplotlib</a:t>
+            </a:r>
+            <a:endParaRPr/>
+          </a:p>
+        </p:txBody>
+      </p:sp>
+      <p:sp>
+        <p:nvSpPr>
+          <p:cNvPr id="99" name="Google Shape;99;p15"/>
+          <p:cNvSpPr txBox="1">
+            <a:spLocks noGrp="1"/>
+          </p:cNvSpPr>
+          <p:nvPr>
+            <p:ph type="sldNum" idx="4294967295"/>
+          </p:nvPr>
+        </p:nvSpPr>
+        <p:spPr>
+          <a:xfrm>
+            <a:off x="8404384" y="4749851"/>
+            <a:ext cx="548700" cy="393600"/>
+          </a:xfrm>
+          <a:prstGeom prst="rect">
+            <a:avLst/>
+          </a:prstGeom>
+        </p:spPr>
+        <p:txBody>
+          <a:bodyPr spcFirstLastPara="1" wrap="square" lIns="91425" tIns="91425" rIns="91425" bIns="91425" anchor="t" anchorCtr="0">
+            <a:noAutofit/>
+          </a:bodyPr>
+          <a:lstStyle/>
+          <a:p>
+            <a:pPr marL="0" lvl="0" indent="0" algn="r" rtl="0">
+              <a:spcBef>
+                <a:spcPts val="0"/>
+              </a:spcBef>
+              <a:spcAft>
+                <a:spcPts val="0"/>
+              </a:spcAft>
+              <a:buNone/>
+            </a:pPr>
+            <a:fld id="{00000000-1234-1234-1234-123412341234}" type="slidenum">
+              <a:rPr lang="en"/>
+              <a:t>34</a:t>
+            </a:fld>
+            <a:endParaRPr/>
+          </a:p>
+        </p:txBody>
+      </p:sp>
+    </p:spTree>
+    <p:extLst>
+      <p:ext uri="{BB962C8B-B14F-4D97-AF65-F5344CB8AC3E}">
+        <p14:creationId xmlns:p14="http://schemas.microsoft.com/office/powerpoint/2010/main" val="2458102878"/>
+      </p:ext>
+    </p:extLst>
+  </p:cSld>
+  <p:clrMapOvr>
+    <a:masterClrMapping/>
+  </p:clrMapOvr>
+</p:sld>
+</file>
+
+<file path=ppt/slides/slide35.xml><?xml version="1.0" encoding="utf-8"?>
+<p:sld xmlns:a="http://schemas.openxmlformats.org/drawingml/2006/main" xmlns:r="http://schemas.openxmlformats.org/officeDocument/2006/relationships" xmlns:p="http://schemas.openxmlformats.org/presentationml/2006/main">
+  <p:cSld>
+    <p:spTree>
+      <p:nvGrpSpPr>
+        <p:cNvPr id="1" name="Shape 96"/>
+        <p:cNvGrpSpPr/>
+        <p:nvPr/>
+      </p:nvGrpSpPr>
+      <p:grpSpPr>
+        <a:xfrm>
+          <a:off x="0" y="0"/>
+          <a:ext cx="0" cy="0"/>
+          <a:chOff x="0" y="0"/>
+          <a:chExt cx="0" cy="0"/>
+        </a:xfrm>
+      </p:grpSpPr>
+      <p:sp>
+        <p:nvSpPr>
+          <p:cNvPr id="97" name="Google Shape;97;p15"/>
+          <p:cNvSpPr txBox="1">
+            <a:spLocks noGrp="1"/>
+          </p:cNvSpPr>
+          <p:nvPr>
+            <p:ph type="ctrTitle"/>
+          </p:nvPr>
+        </p:nvSpPr>
+        <p:spPr>
+          <a:xfrm>
+            <a:off x="1655700" y="1991850"/>
+            <a:ext cx="5832600" cy="1159800"/>
+          </a:xfrm>
+          <a:prstGeom prst="rect">
+            <a:avLst/>
+          </a:prstGeom>
+        </p:spPr>
+        <p:txBody>
+          <a:bodyPr spcFirstLastPara="1" wrap="square" lIns="91425" tIns="91425" rIns="91425" bIns="91425" anchor="ctr" anchorCtr="0">
+            <a:noAutofit/>
+          </a:bodyPr>
+          <a:lstStyle/>
+          <a:p>
+            <a:pPr marL="0" lvl="0" indent="0" algn="ctr" rtl="0">
+              <a:spcBef>
+                <a:spcPts val="0"/>
+              </a:spcBef>
+              <a:spcAft>
+                <a:spcPts val="0"/>
+              </a:spcAft>
+              <a:buNone/>
+            </a:pPr>
+            <a:r>
+              <a:rPr lang="en-US" sz="6000">
+                <a:solidFill>
+                  <a:srgbClr val="E6E6E6"/>
+                </a:solidFill>
+              </a:rPr>
+              <a:t>5</a:t>
+            </a:r>
+            <a:endParaRPr sz="6000">
+              <a:solidFill>
+                <a:srgbClr val="E6E6E6"/>
+              </a:solidFill>
+            </a:endParaRPr>
+          </a:p>
+          <a:p>
+            <a:r>
+              <a:rPr lang="en-US"/>
+              <a:t>S</a:t>
+            </a:r>
+            <a:r>
+              <a:rPr lang="en-US" b="1"/>
+              <a:t>cikit-learn</a:t>
+            </a:r>
+            <a:endParaRPr/>
+          </a:p>
+        </p:txBody>
+      </p:sp>
+      <p:sp>
+        <p:nvSpPr>
+          <p:cNvPr id="99" name="Google Shape;99;p15"/>
+          <p:cNvSpPr txBox="1">
+            <a:spLocks noGrp="1"/>
+          </p:cNvSpPr>
+          <p:nvPr>
+            <p:ph type="sldNum" idx="4294967295"/>
+          </p:nvPr>
+        </p:nvSpPr>
+        <p:spPr>
+          <a:xfrm>
+            <a:off x="8404384" y="4749851"/>
+            <a:ext cx="548700" cy="393600"/>
+          </a:xfrm>
+          <a:prstGeom prst="rect">
+            <a:avLst/>
+          </a:prstGeom>
+        </p:spPr>
+        <p:txBody>
+          <a:bodyPr spcFirstLastPara="1" wrap="square" lIns="91425" tIns="91425" rIns="91425" bIns="91425" anchor="t" anchorCtr="0">
+            <a:noAutofit/>
+          </a:bodyPr>
+          <a:lstStyle/>
+          <a:p>
+            <a:pPr marL="0" lvl="0" indent="0" algn="r" rtl="0">
+              <a:spcBef>
+                <a:spcPts val="0"/>
+              </a:spcBef>
+              <a:spcAft>
+                <a:spcPts val="0"/>
+              </a:spcAft>
+              <a:buNone/>
+            </a:pPr>
+            <a:fld id="{00000000-1234-1234-1234-123412341234}" type="slidenum">
+              <a:rPr lang="en"/>
+              <a:t>35</a:t>
+            </a:fld>
+            <a:endParaRPr/>
+          </a:p>
+        </p:txBody>
+      </p:sp>
+    </p:spTree>
+    <p:extLst>
+      <p:ext uri="{BB962C8B-B14F-4D97-AF65-F5344CB8AC3E}">
+        <p14:creationId xmlns:p14="http://schemas.microsoft.com/office/powerpoint/2010/main" val="3753200419"/>
+      </p:ext>
+    </p:extLst>
+  </p:cSld>
+  <p:clrMapOvr>
+    <a:masterClrMapping/>
+  </p:clrMapOvr>
+</p:sld>
+</file>
+
+<file path=ppt/slides/slide36.xml><?xml version="1.0" encoding="utf-8"?>
+<p:sld xmlns:a="http://schemas.openxmlformats.org/drawingml/2006/main" xmlns:r="http://schemas.openxmlformats.org/officeDocument/2006/relationships" xmlns:p="http://schemas.openxmlformats.org/presentationml/2006/main">
+  <p:cSld>
+    <p:spTree>
+      <p:nvGrpSpPr>
+        <p:cNvPr id="1" name="Shape 96"/>
+        <p:cNvGrpSpPr/>
+        <p:nvPr/>
+      </p:nvGrpSpPr>
+      <p:grpSpPr>
+        <a:xfrm>
+          <a:off x="0" y="0"/>
+          <a:ext cx="0" cy="0"/>
+          <a:chOff x="0" y="0"/>
+          <a:chExt cx="0" cy="0"/>
+        </a:xfrm>
+      </p:grpSpPr>
+      <p:sp>
+        <p:nvSpPr>
+          <p:cNvPr id="97" name="Google Shape;97;p15"/>
+          <p:cNvSpPr txBox="1">
+            <a:spLocks noGrp="1"/>
+          </p:cNvSpPr>
+          <p:nvPr>
+            <p:ph type="ctrTitle"/>
+          </p:nvPr>
+        </p:nvSpPr>
+        <p:spPr>
+          <a:xfrm>
+            <a:off x="1655700" y="1991850"/>
+            <a:ext cx="5832600" cy="1159800"/>
+          </a:xfrm>
+          <a:prstGeom prst="rect">
+            <a:avLst/>
+          </a:prstGeom>
+        </p:spPr>
+        <p:txBody>
+          <a:bodyPr spcFirstLastPara="1" wrap="square" lIns="91425" tIns="91425" rIns="91425" bIns="91425" anchor="ctr" anchorCtr="0">
+            <a:noAutofit/>
+          </a:bodyPr>
+          <a:lstStyle/>
+          <a:p>
+            <a:pPr marL="0" lvl="0" indent="0" algn="ctr" rtl="0">
+              <a:spcBef>
+                <a:spcPts val="0"/>
+              </a:spcBef>
+              <a:spcAft>
+                <a:spcPts val="0"/>
+              </a:spcAft>
+              <a:buNone/>
+            </a:pPr>
+            <a:r>
+              <a:rPr lang="en-US" sz="6000">
+                <a:solidFill>
+                  <a:srgbClr val="E6E6E6"/>
+                </a:solidFill>
+              </a:rPr>
+              <a:t>6</a:t>
+            </a:r>
+            <a:endParaRPr sz="6000">
+              <a:solidFill>
+                <a:srgbClr val="E6E6E6"/>
+              </a:solidFill>
+            </a:endParaRPr>
+          </a:p>
+          <a:p>
+            <a:r>
+              <a:rPr lang="en-US">
+                <a:effectLst/>
+              </a:rPr>
+              <a:t>Web Scraping</a:t>
+            </a:r>
+            <a:endParaRPr/>
+          </a:p>
+        </p:txBody>
+      </p:sp>
+      <p:sp>
+        <p:nvSpPr>
+          <p:cNvPr id="99" name="Google Shape;99;p15"/>
+          <p:cNvSpPr txBox="1">
+            <a:spLocks noGrp="1"/>
+          </p:cNvSpPr>
+          <p:nvPr>
+            <p:ph type="sldNum" idx="4294967295"/>
+          </p:nvPr>
+        </p:nvSpPr>
+        <p:spPr>
+          <a:xfrm>
+            <a:off x="8404384" y="4749851"/>
+            <a:ext cx="548700" cy="393600"/>
+          </a:xfrm>
+          <a:prstGeom prst="rect">
+            <a:avLst/>
+          </a:prstGeom>
+        </p:spPr>
+        <p:txBody>
+          <a:bodyPr spcFirstLastPara="1" wrap="square" lIns="91425" tIns="91425" rIns="91425" bIns="91425" anchor="t" anchorCtr="0">
+            <a:noAutofit/>
+          </a:bodyPr>
+          <a:lstStyle/>
+          <a:p>
+            <a:pPr marL="0" lvl="0" indent="0" algn="r" rtl="0">
+              <a:spcBef>
+                <a:spcPts val="0"/>
+              </a:spcBef>
+              <a:spcAft>
+                <a:spcPts val="0"/>
+              </a:spcAft>
+              <a:buNone/>
+            </a:pPr>
+            <a:fld id="{00000000-1234-1234-1234-123412341234}" type="slidenum">
+              <a:rPr lang="en"/>
+              <a:t>36</a:t>
+            </a:fld>
+            <a:endParaRPr/>
+          </a:p>
+        </p:txBody>
+      </p:sp>
+    </p:spTree>
+    <p:extLst>
+      <p:ext uri="{BB962C8B-B14F-4D97-AF65-F5344CB8AC3E}">
         <p14:creationId xmlns:p14="http://schemas.microsoft.com/office/powerpoint/2010/main" val="3538335587"/>
       </p:ext>
     </p:extLst>
@@ -18896,7 +20082,7 @@
 </p:sld>
 </file>
 
-<file path=ppt/slides/slide32.xml><?xml version="1.0" encoding="utf-8"?>
+<file path=ppt/slides/slide37.xml><?xml version="1.0" encoding="utf-8"?>
 <p:sld xmlns:a="http://schemas.openxmlformats.org/drawingml/2006/main" xmlns:r="http://schemas.openxmlformats.org/officeDocument/2006/relationships" xmlns:p="http://schemas.openxmlformats.org/presentationml/2006/main">
   <p:cSld>
     <p:spTree>
@@ -19127,7 +20313,7 @@
             </a:pPr>
             <a:fld id="{00000000-1234-1234-1234-123412341234}" type="slidenum">
               <a:rPr lang="en"/>
-              <a:t>32</a:t>
+              <a:t>37</a:t>
             </a:fld>
             <a:endParaRPr/>
           </a:p>
@@ -19141,7 +20327,7 @@
 </p:sld>
 </file>
 
-<file path=ppt/slides/slide33.xml><?xml version="1.0" encoding="utf-8"?>
+<file path=ppt/slides/slide38.xml><?xml version="1.0" encoding="utf-8"?>
 <p:sld xmlns:a="http://schemas.openxmlformats.org/drawingml/2006/main" xmlns:r="http://schemas.openxmlformats.org/officeDocument/2006/relationships" xmlns:p="http://schemas.openxmlformats.org/presentationml/2006/main">
   <p:cSld>
     <p:spTree>
@@ -19278,7 +20464,7 @@
             </a:pPr>
             <a:fld id="{00000000-1234-1234-1234-123412341234}" type="slidenum">
               <a:rPr lang="en"/>
-              <a:t>33</a:t>
+              <a:t>38</a:t>
             </a:fld>
             <a:endParaRPr/>
           </a:p>

</xml_diff>